<commit_message>
Zweite Version von Fredriks Spielwelt
</commit_message>
<xml_diff>
--- a/20 Spielwelt/40 Fredrik/Presentation.pptx
+++ b/20 Spielwelt/40 Fredrik/Presentation.pptx
@@ -5,9 +5,10 @@
     <p:sldMasterId id="2147483660" r:id="rId1"/>
   </p:sldMasterIdLst>
   <p:sldIdLst>
-    <p:sldId id="256" r:id="rId2"/>
-    <p:sldId id="257" r:id="rId3"/>
-    <p:sldId id="258" r:id="rId4"/>
+    <p:sldId id="263" r:id="rId2"/>
+    <p:sldId id="260" r:id="rId3"/>
+    <p:sldId id="261" r:id="rId4"/>
+    <p:sldId id="262" r:id="rId5"/>
   </p:sldIdLst>
   <p:sldSz cx="9144000" cy="6858000" type="screen4x3"/>
   <p:notesSz cx="6858000" cy="9144000"/>
@@ -1026,6 +1027,13 @@
         </dgm:presLayoutVars>
       </dgm:prSet>
       <dgm:spPr/>
+      <dgm:t>
+        <a:bodyPr/>
+        <a:lstStyle/>
+        <a:p>
+          <a:endParaRPr lang="de-DE"/>
+        </a:p>
+      </dgm:t>
     </dgm:pt>
     <dgm:pt modelId="{24936416-0D4C-4490-897D-9A151138B2AE}" type="pres">
       <dgm:prSet presAssocID="{2DE00F2A-33F9-49DB-978D-605D0F6AB2E8}" presName="cycle" presStyleCnt="0"/>
@@ -1049,6 +1057,13 @@
     <dgm:pt modelId="{0EE17A25-13C7-44FF-B13F-66A2A870BB24}" type="pres">
       <dgm:prSet presAssocID="{94873A21-82F8-4117-95E1-338BB9417686}" presName="sibTransFirstNode" presStyleLbl="bgShp" presStyleIdx="0" presStyleCnt="1"/>
       <dgm:spPr/>
+      <dgm:t>
+        <a:bodyPr/>
+        <a:lstStyle/>
+        <a:p>
+          <a:endParaRPr lang="de-DE"/>
+        </a:p>
+      </dgm:t>
     </dgm:pt>
     <dgm:pt modelId="{98CEE9BE-415F-47C0-9643-33D7FC07E2E3}" type="pres">
       <dgm:prSet presAssocID="{98F76748-B020-412E-BE50-A8D179A2E401}" presName="nodeFollowingNodes" presStyleLbl="node1" presStyleIdx="1" presStyleCnt="4">
@@ -1072,6 +1087,13 @@
         </dgm:presLayoutVars>
       </dgm:prSet>
       <dgm:spPr/>
+      <dgm:t>
+        <a:bodyPr/>
+        <a:lstStyle/>
+        <a:p>
+          <a:endParaRPr lang="de-DE"/>
+        </a:p>
+      </dgm:t>
     </dgm:pt>
     <dgm:pt modelId="{21834862-793C-44C0-ACDC-22A3040AF8AF}" type="pres">
       <dgm:prSet presAssocID="{C3B6D9F5-2A26-4363-BD47-4F13DC597DF4}" presName="nodeFollowingNodes" presStyleLbl="node1" presStyleIdx="3" presStyleCnt="4">
@@ -1090,22 +1112,22 @@
     </dgm:pt>
   </dgm:ptLst>
   <dgm:cxnLst>
+    <dgm:cxn modelId="{CF363F68-1303-4177-8E07-BA39229A84EC}" type="presOf" srcId="{FA7126C0-D531-4A4F-9BCE-8683C10C0763}" destId="{59989E37-DFF8-4135-9909-68D42566A85D}" srcOrd="0" destOrd="0" presId="urn:microsoft.com/office/officeart/2005/8/layout/cycle3"/>
+    <dgm:cxn modelId="{8F945C33-A827-4E7D-95D8-0E629B4A64D0}" type="presOf" srcId="{453A4928-4178-4DAD-A889-E3C50623955D}" destId="{2EB9F814-6C55-4726-BBCA-46A071E32301}" srcOrd="0" destOrd="0" presId="urn:microsoft.com/office/officeart/2005/8/layout/cycle3"/>
     <dgm:cxn modelId="{12EC8EE3-CC36-4D43-A6EF-B35E8C420461}" srcId="{2DE00F2A-33F9-49DB-978D-605D0F6AB2E8}" destId="{C3B6D9F5-2A26-4363-BD47-4F13DC597DF4}" srcOrd="3" destOrd="0" parTransId="{83E3ADEA-761C-43EB-AC43-8DBB84158A06}" sibTransId="{3E2494F1-41A3-4E7E-878D-1745D2DCEC9E}"/>
-    <dgm:cxn modelId="{8513C9AA-5DCB-42A6-810F-2E255DE366A5}" type="presOf" srcId="{453A4928-4178-4DAD-A889-E3C50623955D}" destId="{2EB9F814-6C55-4726-BBCA-46A071E32301}" srcOrd="0" destOrd="0" presId="urn:microsoft.com/office/officeart/2005/8/layout/cycle3"/>
-    <dgm:cxn modelId="{CF740875-AFD5-4595-8D1A-DEA0CC1EFFC3}" type="presOf" srcId="{98F76748-B020-412E-BE50-A8D179A2E401}" destId="{98CEE9BE-415F-47C0-9643-33D7FC07E2E3}" srcOrd="0" destOrd="0" presId="urn:microsoft.com/office/officeart/2005/8/layout/cycle3"/>
+    <dgm:cxn modelId="{A35CA988-E54D-458A-BBC7-850743031A2C}" type="presOf" srcId="{2DE00F2A-33F9-49DB-978D-605D0F6AB2E8}" destId="{18E123BA-0220-438F-8BDA-323DB928DD77}" srcOrd="0" destOrd="0" presId="urn:microsoft.com/office/officeart/2005/8/layout/cycle3"/>
+    <dgm:cxn modelId="{92651AD3-96D5-4D99-8CFD-885C394D908D}" type="presOf" srcId="{94873A21-82F8-4117-95E1-338BB9417686}" destId="{0EE17A25-13C7-44FF-B13F-66A2A870BB24}" srcOrd="0" destOrd="0" presId="urn:microsoft.com/office/officeart/2005/8/layout/cycle3"/>
+    <dgm:cxn modelId="{B42CC7C6-01F5-47E9-BC3B-833E35DD7ED3}" type="presOf" srcId="{C3B6D9F5-2A26-4363-BD47-4F13DC597DF4}" destId="{21834862-793C-44C0-ACDC-22A3040AF8AF}" srcOrd="0" destOrd="0" presId="urn:microsoft.com/office/officeart/2005/8/layout/cycle3"/>
+    <dgm:cxn modelId="{E41FC1E6-DF8F-41F9-AE55-BBFB7B03FBA7}" type="presOf" srcId="{98F76748-B020-412E-BE50-A8D179A2E401}" destId="{98CEE9BE-415F-47C0-9643-33D7FC07E2E3}" srcOrd="0" destOrd="0" presId="urn:microsoft.com/office/officeart/2005/8/layout/cycle3"/>
     <dgm:cxn modelId="{1D107623-B8CE-43EC-9194-54A98251F1E5}" srcId="{2DE00F2A-33F9-49DB-978D-605D0F6AB2E8}" destId="{FA7126C0-D531-4A4F-9BCE-8683C10C0763}" srcOrd="2" destOrd="0" parTransId="{A54005F9-52A6-4D0C-B700-2A36AF911D10}" sibTransId="{B8FC9363-F0D3-4DCB-BDDE-35A132145FF9}"/>
     <dgm:cxn modelId="{910C1FC4-25C1-46F7-AC84-BEEA0FBDF738}" srcId="{2DE00F2A-33F9-49DB-978D-605D0F6AB2E8}" destId="{453A4928-4178-4DAD-A889-E3C50623955D}" srcOrd="0" destOrd="0" parTransId="{6975FCD4-F572-475F-8E88-AC3825A658A3}" sibTransId="{94873A21-82F8-4117-95E1-338BB9417686}"/>
-    <dgm:cxn modelId="{66BFD4D7-6B8E-4E5C-BD64-74FAFB982EA6}" type="presOf" srcId="{FA7126C0-D531-4A4F-9BCE-8683C10C0763}" destId="{59989E37-DFF8-4135-9909-68D42566A85D}" srcOrd="0" destOrd="0" presId="urn:microsoft.com/office/officeart/2005/8/layout/cycle3"/>
-    <dgm:cxn modelId="{3BF9A866-404D-42F6-9685-71B42426471A}" type="presOf" srcId="{C3B6D9F5-2A26-4363-BD47-4F13DC597DF4}" destId="{21834862-793C-44C0-ACDC-22A3040AF8AF}" srcOrd="0" destOrd="0" presId="urn:microsoft.com/office/officeart/2005/8/layout/cycle3"/>
-    <dgm:cxn modelId="{D24203DF-E614-48F7-9BF0-2F6BF94B7EB5}" type="presOf" srcId="{2DE00F2A-33F9-49DB-978D-605D0F6AB2E8}" destId="{18E123BA-0220-438F-8BDA-323DB928DD77}" srcOrd="0" destOrd="0" presId="urn:microsoft.com/office/officeart/2005/8/layout/cycle3"/>
-    <dgm:cxn modelId="{0DAFC36C-F48E-4175-976C-CF6E93909344}" type="presOf" srcId="{94873A21-82F8-4117-95E1-338BB9417686}" destId="{0EE17A25-13C7-44FF-B13F-66A2A870BB24}" srcOrd="0" destOrd="0" presId="urn:microsoft.com/office/officeart/2005/8/layout/cycle3"/>
     <dgm:cxn modelId="{AC879D75-F8BB-432B-91EC-49C7E886E35B}" srcId="{2DE00F2A-33F9-49DB-978D-605D0F6AB2E8}" destId="{98F76748-B020-412E-BE50-A8D179A2E401}" srcOrd="1" destOrd="0" parTransId="{C5595FF2-28C7-44C4-A0A6-93474DF90D17}" sibTransId="{2076B39D-D815-4AC4-B85E-00E361395FBA}"/>
-    <dgm:cxn modelId="{9FFC5102-E5F8-45F9-8B66-8A602B0D3DFF}" type="presParOf" srcId="{18E123BA-0220-438F-8BDA-323DB928DD77}" destId="{24936416-0D4C-4490-897D-9A151138B2AE}" srcOrd="0" destOrd="0" presId="urn:microsoft.com/office/officeart/2005/8/layout/cycle3"/>
-    <dgm:cxn modelId="{CCDD5FC4-144A-4581-B9F8-3AAFE65C1ED1}" type="presParOf" srcId="{24936416-0D4C-4490-897D-9A151138B2AE}" destId="{2EB9F814-6C55-4726-BBCA-46A071E32301}" srcOrd="0" destOrd="0" presId="urn:microsoft.com/office/officeart/2005/8/layout/cycle3"/>
-    <dgm:cxn modelId="{82D1FC6A-22E4-41C8-BCC5-51784CAEDD5F}" type="presParOf" srcId="{24936416-0D4C-4490-897D-9A151138B2AE}" destId="{0EE17A25-13C7-44FF-B13F-66A2A870BB24}" srcOrd="1" destOrd="0" presId="urn:microsoft.com/office/officeart/2005/8/layout/cycle3"/>
-    <dgm:cxn modelId="{61A3B060-F4E3-41E3-9650-AE8681AB0A6C}" type="presParOf" srcId="{24936416-0D4C-4490-897D-9A151138B2AE}" destId="{98CEE9BE-415F-47C0-9643-33D7FC07E2E3}" srcOrd="2" destOrd="0" presId="urn:microsoft.com/office/officeart/2005/8/layout/cycle3"/>
-    <dgm:cxn modelId="{5C2DABF3-F8BC-41F8-A98D-4C1E9B6B093C}" type="presParOf" srcId="{24936416-0D4C-4490-897D-9A151138B2AE}" destId="{59989E37-DFF8-4135-9909-68D42566A85D}" srcOrd="3" destOrd="0" presId="urn:microsoft.com/office/officeart/2005/8/layout/cycle3"/>
-    <dgm:cxn modelId="{520A3283-4FC4-4392-8B4A-B8D17DADAAF1}" type="presParOf" srcId="{24936416-0D4C-4490-897D-9A151138B2AE}" destId="{21834862-793C-44C0-ACDC-22A3040AF8AF}" srcOrd="4" destOrd="0" presId="urn:microsoft.com/office/officeart/2005/8/layout/cycle3"/>
+    <dgm:cxn modelId="{EA2426EC-22DE-4D68-AEF9-C76E24F0DA6F}" type="presParOf" srcId="{18E123BA-0220-438F-8BDA-323DB928DD77}" destId="{24936416-0D4C-4490-897D-9A151138B2AE}" srcOrd="0" destOrd="0" presId="urn:microsoft.com/office/officeart/2005/8/layout/cycle3"/>
+    <dgm:cxn modelId="{65F2082B-74CB-4AAF-ABE4-D472432EBFF1}" type="presParOf" srcId="{24936416-0D4C-4490-897D-9A151138B2AE}" destId="{2EB9F814-6C55-4726-BBCA-46A071E32301}" srcOrd="0" destOrd="0" presId="urn:microsoft.com/office/officeart/2005/8/layout/cycle3"/>
+    <dgm:cxn modelId="{61E53D9F-D1F6-4940-8D2E-340EBD196CBA}" type="presParOf" srcId="{24936416-0D4C-4490-897D-9A151138B2AE}" destId="{0EE17A25-13C7-44FF-B13F-66A2A870BB24}" srcOrd="1" destOrd="0" presId="urn:microsoft.com/office/officeart/2005/8/layout/cycle3"/>
+    <dgm:cxn modelId="{74C92247-4279-472B-9432-2F90A72B5D65}" type="presParOf" srcId="{24936416-0D4C-4490-897D-9A151138B2AE}" destId="{98CEE9BE-415F-47C0-9643-33D7FC07E2E3}" srcOrd="2" destOrd="0" presId="urn:microsoft.com/office/officeart/2005/8/layout/cycle3"/>
+    <dgm:cxn modelId="{C3D28541-8F35-4C9B-B06E-4C382B959BBD}" type="presParOf" srcId="{24936416-0D4C-4490-897D-9A151138B2AE}" destId="{59989E37-DFF8-4135-9909-68D42566A85D}" srcOrd="3" destOrd="0" presId="urn:microsoft.com/office/officeart/2005/8/layout/cycle3"/>
+    <dgm:cxn modelId="{93DC0777-D8EA-4C5D-9103-2F28495C59D5}" type="presParOf" srcId="{24936416-0D4C-4490-897D-9A151138B2AE}" destId="{21834862-793C-44C0-ACDC-22A3040AF8AF}" srcOrd="4" destOrd="0" presId="urn:microsoft.com/office/officeart/2005/8/layout/cycle3"/>
   </dgm:cxnLst>
   <dgm:bg/>
   <dgm:whole/>
@@ -1132,15 +1154,15 @@
       </dsp:nvSpPr>
       <dsp:spPr>
         <a:xfrm>
-          <a:off x="1866556" y="-109352"/>
-          <a:ext cx="4496487" cy="4496487"/>
+          <a:off x="1310710" y="-100541"/>
+          <a:ext cx="4517714" cy="4517714"/>
         </a:xfrm>
         <a:prstGeom prst="circularArrow">
           <a:avLst>
             <a:gd name="adj1" fmla="val 4668"/>
             <a:gd name="adj2" fmla="val 272909"/>
-            <a:gd name="adj3" fmla="val 12884825"/>
-            <a:gd name="adj4" fmla="val 17994506"/>
+            <a:gd name="adj3" fmla="val 12935803"/>
+            <a:gd name="adj4" fmla="val 17960042"/>
             <a:gd name="adj5" fmla="val 4847"/>
           </a:avLst>
         </a:prstGeom>
@@ -1182,8 +1204,8 @@
       </dsp:nvSpPr>
       <dsp:spPr>
         <a:xfrm>
-          <a:off x="2638052" y="1351"/>
-          <a:ext cx="2953494" cy="1476747"/>
+          <a:off x="2105487" y="62"/>
+          <a:ext cx="2928161" cy="1464080"/>
         </a:xfrm>
         <a:prstGeom prst="roundRect">
           <a:avLst/>
@@ -1250,8 +1272,8 @@
         </a:p>
       </dsp:txBody>
       <dsp:txXfrm>
-        <a:off x="2710141" y="73440"/>
-        <a:ext cx="2809316" cy="1332569"/>
+        <a:off x="2176957" y="71532"/>
+        <a:ext cx="2785221" cy="1321140"/>
       </dsp:txXfrm>
     </dsp:sp>
     <dsp:sp modelId="{98CEE9BE-415F-47C0-9643-33D7FC07E2E3}">
@@ -1261,8 +1283,8 @@
       </dsp:nvSpPr>
       <dsp:spPr>
         <a:xfrm>
-          <a:off x="4252590" y="1615888"/>
-          <a:ext cx="2953494" cy="1476747"/>
+          <a:off x="3727646" y="1622222"/>
+          <a:ext cx="2928161" cy="1464080"/>
         </a:xfrm>
         <a:prstGeom prst="roundRect">
           <a:avLst/>
@@ -1329,8 +1351,8 @@
         </a:p>
       </dsp:txBody>
       <dsp:txXfrm>
-        <a:off x="4324679" y="1687977"/>
-        <a:ext cx="2809316" cy="1332569"/>
+        <a:off x="3799116" y="1693692"/>
+        <a:ext cx="2785221" cy="1321140"/>
       </dsp:txXfrm>
     </dsp:sp>
     <dsp:sp modelId="{59989E37-DFF8-4135-9909-68D42566A85D}">
@@ -1340,8 +1362,8 @@
       </dsp:nvSpPr>
       <dsp:spPr>
         <a:xfrm>
-          <a:off x="2638052" y="3230426"/>
-          <a:ext cx="2953494" cy="1476747"/>
+          <a:off x="2105487" y="3244381"/>
+          <a:ext cx="2928161" cy="1464080"/>
         </a:xfrm>
         <a:prstGeom prst="roundRect">
           <a:avLst/>
@@ -1408,8 +1430,8 @@
         </a:p>
       </dsp:txBody>
       <dsp:txXfrm>
-        <a:off x="2710141" y="3302515"/>
-        <a:ext cx="2809316" cy="1332569"/>
+        <a:off x="2176957" y="3315851"/>
+        <a:ext cx="2785221" cy="1321140"/>
       </dsp:txXfrm>
     </dsp:sp>
     <dsp:sp modelId="{21834862-793C-44C0-ACDC-22A3040AF8AF}">
@@ -1419,8 +1441,8 @@
       </dsp:nvSpPr>
       <dsp:spPr>
         <a:xfrm>
-          <a:off x="1023515" y="1615888"/>
-          <a:ext cx="2953494" cy="1476747"/>
+          <a:off x="483327" y="1622222"/>
+          <a:ext cx="2928161" cy="1464080"/>
         </a:xfrm>
         <a:prstGeom prst="roundRect">
           <a:avLst/>
@@ -1487,8 +1509,8 @@
         </a:p>
       </dsp:txBody>
       <dsp:txXfrm>
-        <a:off x="1095604" y="1687977"/>
-        <a:ext cx="2809316" cy="1332569"/>
+        <a:off x="554797" y="1693692"/>
+        <a:ext cx="2785221" cy="1321140"/>
       </dsp:txXfrm>
     </dsp:sp>
   </dsp:spTree>
@@ -3032,7 +3054,7 @@
 </file>
 
 <file path=ppt/slideLayouts/slideLayout1.xml><?xml version="1.0" encoding="utf-8"?>
-<p:sldLayout xmlns:a="http://schemas.openxmlformats.org/drawingml/2006/main" xmlns:r="http://schemas.openxmlformats.org/officeDocument/2006/relationships" xmlns:p="http://schemas.openxmlformats.org/presentationml/2006/main" type="title" preserve="1">
+<p:sldLayout xmlns:a="http://schemas.openxmlformats.org/drawingml/2006/main" xmlns:r="http://schemas.openxmlformats.org/officeDocument/2006/relationships" xmlns:p="http://schemas.openxmlformats.org/presentationml/2006/main" preserve="1" userDrawn="1">
   <p:cSld name="Titelfolie">
     <p:spTree>
       <p:nvGrpSpPr>
@@ -3048,83 +3070,6 @@
           <a:chExt cx="0" cy="0"/>
         </a:xfrm>
       </p:grpSpPr>
-      <p:sp>
-        <p:nvSpPr>
-          <p:cNvPr id="8" name="Titel 7"/>
-          <p:cNvSpPr>
-            <a:spLocks noGrp="1"/>
-          </p:cNvSpPr>
-          <p:nvPr>
-            <p:ph type="ctrTitle"/>
-          </p:nvPr>
-        </p:nvSpPr>
-        <p:spPr>
-          <a:xfrm>
-            <a:off x="422030" y="1371600"/>
-            <a:ext cx="8229600" cy="1828800"/>
-          </a:xfrm>
-        </p:spPr>
-        <p:txBody>
-          <a:bodyPr vert="horz" lIns="45720" tIns="0" rIns="45720" bIns="0" anchor="b">
-            <a:normAutofit/>
-            <a:scene3d>
-              <a:camera prst="orthographicFront"/>
-              <a:lightRig rig="soft" dir="t">
-                <a:rot lat="0" lon="0" rev="17220000"/>
-              </a:lightRig>
-            </a:scene3d>
-            <a:sp3d prstMaterial="softEdge">
-              <a:bevelT w="38100" h="38100"/>
-            </a:sp3d>
-          </a:bodyPr>
-          <a:lstStyle>
-            <a:lvl1pPr>
-              <a:defRPr sz="4800" b="1" cap="all" baseline="0">
-                <a:ln w="6350">
-                  <a:noFill/>
-                </a:ln>
-                <a:gradFill>
-                  <a:gsLst>
-                    <a:gs pos="0">
-                      <a:schemeClr val="accent1">
-                        <a:tint val="73000"/>
-                        <a:satMod val="145000"/>
-                      </a:schemeClr>
-                    </a:gs>
-                    <a:gs pos="73000">
-                      <a:schemeClr val="accent1">
-                        <a:tint val="73000"/>
-                        <a:satMod val="145000"/>
-                      </a:schemeClr>
-                    </a:gs>
-                    <a:gs pos="100000">
-                      <a:schemeClr val="accent1">
-                        <a:tint val="83000"/>
-                        <a:satMod val="143000"/>
-                      </a:schemeClr>
-                    </a:gs>
-                  </a:gsLst>
-                  <a:lin ang="4800000" scaled="1"/>
-                </a:gradFill>
-                <a:effectLst>
-                  <a:outerShdw blurRad="127000" dist="200000" dir="2700000" algn="tl" rotWithShape="0">
-                    <a:srgbClr val="000000">
-                      <a:alpha val="30000"/>
-                    </a:srgbClr>
-                  </a:outerShdw>
-                </a:effectLst>
-              </a:defRPr>
-            </a:lvl1pPr>
-          </a:lstStyle>
-          <a:p>
-            <a:r>
-              <a:rPr kumimoji="0" lang="de-DE" smtClean="0"/>
-              <a:t>Titelmasterformat durch Klicken bearbeiten</a:t>
-            </a:r>
-            <a:endParaRPr kumimoji="0" lang="en-US"/>
-          </a:p>
-        </p:txBody>
-      </p:sp>
       <p:sp>
         <p:nvSpPr>
           <p:cNvPr id="28" name="Datumsplatzhalter 27"/>
@@ -3255,11 +3200,46 @@
           </a:p>
         </p:txBody>
       </p:sp>
+      <p:sp>
+        <p:nvSpPr>
+          <p:cNvPr id="2" name="Titel 1"/>
+          <p:cNvSpPr>
+            <a:spLocks noGrp="1"/>
+          </p:cNvSpPr>
+          <p:nvPr>
+            <p:ph type="title"/>
+          </p:nvPr>
+        </p:nvSpPr>
+        <p:spPr>
+          <a:xfrm>
+            <a:off x="1331640" y="0"/>
+            <a:ext cx="6480720" cy="1268760"/>
+          </a:xfrm>
+        </p:spPr>
+        <p:txBody>
+          <a:bodyPr/>
+          <a:lstStyle/>
+          <a:p>
+            <a:r>
+              <a:rPr lang="de-DE" dirty="0" smtClean="0"/>
+              <a:t>Titelmasterformat durch Klicken bearbeiten</a:t>
+            </a:r>
+            <a:endParaRPr lang="de-DE" dirty="0"/>
+          </a:p>
+        </p:txBody>
+      </p:sp>
     </p:spTree>
   </p:cSld>
   <p:clrMapOvr>
     <a:masterClrMapping/>
   </p:clrMapOvr>
+  <p:timing>
+    <p:tnLst>
+      <p:par>
+        <p:cTn id="1" dur="indefinite" restart="never" nodeType="tmRoot"/>
+      </p:par>
+    </p:tnLst>
+  </p:timing>
 </p:sldLayout>
 </file>
 
@@ -3612,7 +3592,7 @@
 </file>
 
 <file path=ppt/slideLayouts/slideLayout2.xml><?xml version="1.0" encoding="utf-8"?>
-<p:sldLayout xmlns:a="http://schemas.openxmlformats.org/drawingml/2006/main" xmlns:r="http://schemas.openxmlformats.org/officeDocument/2006/relationships" xmlns:p="http://schemas.openxmlformats.org/presentationml/2006/main" type="obj" preserve="1">
+<p:sldLayout xmlns:a="http://schemas.openxmlformats.org/drawingml/2006/main" xmlns:r="http://schemas.openxmlformats.org/officeDocument/2006/relationships" xmlns:p="http://schemas.openxmlformats.org/presentationml/2006/main" preserve="1" userDrawn="1">
   <p:cSld name="Titel und Inhalt">
     <p:spTree>
       <p:nvGrpSpPr>
@@ -3630,29 +3610,6 @@
       </p:grpSpPr>
       <p:sp>
         <p:nvSpPr>
-          <p:cNvPr id="2" name="Titel 1"/>
-          <p:cNvSpPr>
-            <a:spLocks noGrp="1"/>
-          </p:cNvSpPr>
-          <p:nvPr>
-            <p:ph type="title"/>
-          </p:nvPr>
-        </p:nvSpPr>
-        <p:spPr/>
-        <p:txBody>
-          <a:bodyPr/>
-          <a:lstStyle/>
-          <a:p>
-            <a:r>
-              <a:rPr kumimoji="0" lang="de-DE" smtClean="0"/>
-              <a:t>Titelmasterformat durch Klicken bearbeiten</a:t>
-            </a:r>
-            <a:endParaRPr kumimoji="0" lang="en-US"/>
-          </a:p>
-        </p:txBody>
-      </p:sp>
-      <p:sp>
-        <p:nvSpPr>
           <p:cNvPr id="3" name="Inhaltsplatzhalter 2"/>
           <p:cNvSpPr>
             <a:spLocks noGrp="1"/>
@@ -3722,7 +3679,7 @@
             <a:fld id="{7CB97365-EBCA-4027-87D5-99FC1D4DF0BB}" type="datetimeFigureOut">
               <a:rPr lang="en-US" smtClean="0"/>
               <a:pPr eaLnBrk="1" latinLnBrk="0" hangingPunct="1"/>
-              <a:t>9/18/2011</a:t>
+              <a:t>9/19/2011</a:t>
             </a:fld>
             <a:endParaRPr lang="en-US"/>
           </a:p>
@@ -3772,16 +3729,51 @@
           </a:p>
         </p:txBody>
       </p:sp>
+      <p:sp>
+        <p:nvSpPr>
+          <p:cNvPr id="10" name="Titel 9"/>
+          <p:cNvSpPr>
+            <a:spLocks noGrp="1"/>
+          </p:cNvSpPr>
+          <p:nvPr>
+            <p:ph type="title"/>
+          </p:nvPr>
+        </p:nvSpPr>
+        <p:spPr>
+          <a:xfrm>
+            <a:off x="1331640" y="0"/>
+            <a:ext cx="6480720" cy="1268760"/>
+          </a:xfrm>
+        </p:spPr>
+        <p:txBody>
+          <a:bodyPr/>
+          <a:lstStyle/>
+          <a:p>
+            <a:r>
+              <a:rPr lang="de-DE" smtClean="0"/>
+              <a:t>Titelmasterformat durch Klicken bearbeiten</a:t>
+            </a:r>
+            <a:endParaRPr lang="de-DE"/>
+          </a:p>
+        </p:txBody>
+      </p:sp>
     </p:spTree>
   </p:cSld>
   <p:clrMapOvr>
     <a:masterClrMapping/>
   </p:clrMapOvr>
+  <p:timing>
+    <p:tnLst>
+      <p:par>
+        <p:cTn id="1" dur="indefinite" restart="never" nodeType="tmRoot"/>
+      </p:par>
+    </p:tnLst>
+  </p:timing>
 </p:sldLayout>
 </file>
 
 <file path=ppt/slideLayouts/slideLayout3.xml><?xml version="1.0" encoding="utf-8"?>
-<p:sldLayout xmlns:a="http://schemas.openxmlformats.org/drawingml/2006/main" xmlns:r="http://schemas.openxmlformats.org/officeDocument/2006/relationships" xmlns:p="http://schemas.openxmlformats.org/presentationml/2006/main" type="secHead" preserve="1">
+<p:sldLayout xmlns:a="http://schemas.openxmlformats.org/drawingml/2006/main" xmlns:r="http://schemas.openxmlformats.org/officeDocument/2006/relationships" xmlns:p="http://schemas.openxmlformats.org/presentationml/2006/main" preserve="1" userDrawn="1">
   <p:cSld name="Abschnitts-&#10;überschrift">
     <p:bg>
       <p:bgRef idx="1003">
@@ -3802,78 +3794,6 @@
           <a:chExt cx="0" cy="0"/>
         </a:xfrm>
       </p:grpSpPr>
-      <p:sp>
-        <p:nvSpPr>
-          <p:cNvPr id="2" name="Titel 1"/>
-          <p:cNvSpPr>
-            <a:spLocks noGrp="1"/>
-          </p:cNvSpPr>
-          <p:nvPr>
-            <p:ph type="title"/>
-          </p:nvPr>
-        </p:nvSpPr>
-        <p:spPr>
-          <a:xfrm>
-            <a:off x="1600200" y="609600"/>
-            <a:ext cx="7086600" cy="1828800"/>
-          </a:xfrm>
-        </p:spPr>
-        <p:txBody>
-          <a:bodyPr vert="horz" bIns="0" anchor="b">
-            <a:noAutofit/>
-            <a:scene3d>
-              <a:camera prst="orthographicFront"/>
-              <a:lightRig rig="soft" dir="t">
-                <a:rot lat="0" lon="0" rev="17220000"/>
-              </a:lightRig>
-            </a:scene3d>
-            <a:sp3d prstMaterial="softEdge">
-              <a:bevelT w="38100" h="38100"/>
-              <a:contourClr>
-                <a:schemeClr val="tx2">
-                  <a:shade val="50000"/>
-                </a:schemeClr>
-              </a:contourClr>
-            </a:sp3d>
-          </a:bodyPr>
-          <a:lstStyle>
-            <a:lvl1pPr algn="l" rtl="0">
-              <a:spcBef>
-                <a:spcPct val="0"/>
-              </a:spcBef>
-              <a:buNone/>
-              <a:defRPr sz="4800" b="1" cap="none" baseline="0">
-                <a:ln w="6350">
-                  <a:noFill/>
-                </a:ln>
-                <a:solidFill>
-                  <a:schemeClr val="accent1">
-                    <a:tint val="90000"/>
-                    <a:satMod val="120000"/>
-                  </a:schemeClr>
-                </a:solidFill>
-                <a:effectLst>
-                  <a:outerShdw blurRad="114300" dist="101600" dir="2700000" algn="tl" rotWithShape="0">
-                    <a:srgbClr val="000000">
-                      <a:alpha val="40000"/>
-                    </a:srgbClr>
-                  </a:outerShdw>
-                </a:effectLst>
-                <a:latin typeface="+mj-lt"/>
-                <a:ea typeface="+mj-ea"/>
-                <a:cs typeface="+mj-cs"/>
-              </a:defRPr>
-            </a:lvl1pPr>
-          </a:lstStyle>
-          <a:p>
-            <a:r>
-              <a:rPr kumimoji="0" lang="de-DE" smtClean="0"/>
-              <a:t>Titelmasterformat durch Klicken bearbeiten</a:t>
-            </a:r>
-            <a:endParaRPr kumimoji="0" lang="en-US"/>
-          </a:p>
-        </p:txBody>
-      </p:sp>
       <p:sp>
         <p:nvSpPr>
           <p:cNvPr id="3" name="Textplatzhalter 2"/>
@@ -4025,11 +3945,41 @@
           </a:p>
         </p:txBody>
       </p:sp>
+      <p:sp>
+        <p:nvSpPr>
+          <p:cNvPr id="7" name="Titel 6"/>
+          <p:cNvSpPr>
+            <a:spLocks noGrp="1"/>
+          </p:cNvSpPr>
+          <p:nvPr>
+            <p:ph type="title"/>
+          </p:nvPr>
+        </p:nvSpPr>
+        <p:spPr/>
+        <p:txBody>
+          <a:bodyPr/>
+          <a:lstStyle/>
+          <a:p>
+            <a:r>
+              <a:rPr lang="de-DE" smtClean="0"/>
+              <a:t>Titelmasterformat durch Klicken bearbeiten</a:t>
+            </a:r>
+            <a:endParaRPr lang="de-DE"/>
+          </a:p>
+        </p:txBody>
+      </p:sp>
     </p:spTree>
   </p:cSld>
   <p:clrMapOvr>
     <a:overrideClrMapping bg1="dk1" tx1="lt1" bg2="dk2" tx2="lt2" accent1="accent1" accent2="accent2" accent3="accent3" accent4="accent4" accent5="accent5" accent6="accent6" hlink="hlink" folHlink="folHlink"/>
   </p:clrMapOvr>
+  <p:timing>
+    <p:tnLst>
+      <p:par>
+        <p:cTn id="1" dur="indefinite" restart="never" nodeType="tmRoot"/>
+      </p:par>
+    </p:tnLst>
+  </p:timing>
 </p:sldLayout>
 </file>
 
@@ -4293,6 +4243,13 @@
   <p:clrMapOvr>
     <a:masterClrMapping/>
   </p:clrMapOvr>
+  <p:timing>
+    <p:tnLst>
+      <p:par>
+        <p:cTn id="1" dur="indefinite" restart="never" nodeType="tmRoot"/>
+      </p:par>
+    </p:tnLst>
+  </p:timing>
 </p:sldLayout>
 </file>
 
@@ -5439,48 +5396,6 @@
       </p:grpSpPr>
       <p:sp>
         <p:nvSpPr>
-          <p:cNvPr id="22" name="Titelplatzhalter 21"/>
-          <p:cNvSpPr>
-            <a:spLocks noGrp="1"/>
-          </p:cNvSpPr>
-          <p:nvPr>
-            <p:ph type="title"/>
-          </p:nvPr>
-        </p:nvSpPr>
-        <p:spPr>
-          <a:xfrm>
-            <a:off x="457200" y="274638"/>
-            <a:ext cx="8229600" cy="1143000"/>
-          </a:xfrm>
-          <a:prstGeom prst="rect">
-            <a:avLst/>
-          </a:prstGeom>
-        </p:spPr>
-        <p:txBody>
-          <a:bodyPr vert="horz" anchor="ctr">
-            <a:normAutofit/>
-            <a:scene3d>
-              <a:camera prst="orthographicFront"/>
-              <a:lightRig rig="soft" dir="t">
-                <a:rot lat="0" lon="0" rev="16800000"/>
-              </a:lightRig>
-            </a:scene3d>
-            <a:sp3d prstMaterial="softEdge">
-              <a:bevelT w="38100" h="38100"/>
-            </a:sp3d>
-          </a:bodyPr>
-          <a:lstStyle/>
-          <a:p>
-            <a:r>
-              <a:rPr kumimoji="0" lang="de-DE" smtClean="0"/>
-              <a:t>Titelmasterformat durch Klicken bearbeiten</a:t>
-            </a:r>
-            <a:endParaRPr kumimoji="0" lang="en-US"/>
-          </a:p>
-        </p:txBody>
-      </p:sp>
-      <p:sp>
-        <p:nvSpPr>
           <p:cNvPr id="13" name="Textplatzhalter 12"/>
           <p:cNvSpPr>
             <a:spLocks noGrp="1"/>
@@ -5578,7 +5493,7 @@
             <a:fld id="{7CB97365-EBCA-4027-87D5-99FC1D4DF0BB}" type="datetimeFigureOut">
               <a:rPr lang="en-US" smtClean="0"/>
               <a:pPr eaLnBrk="1" latinLnBrk="0" hangingPunct="1"/>
-              <a:t>9/18/2011</a:t>
+              <a:t>9/19/2011</a:t>
             </a:fld>
             <a:endParaRPr lang="en-US">
               <a:solidFill>
@@ -5682,6 +5597,96 @@
           </a:p>
         </p:txBody>
       </p:sp>
+      <p:sp>
+        <p:nvSpPr>
+          <p:cNvPr id="2" name="Rechteck 1"/>
+          <p:cNvSpPr/>
+          <p:nvPr userDrawn="1"/>
+        </p:nvSpPr>
+        <p:spPr>
+          <a:xfrm>
+            <a:off x="1313638" y="0"/>
+            <a:ext cx="6516724" cy="1268760"/>
+          </a:xfrm>
+          <a:prstGeom prst="rect">
+            <a:avLst/>
+          </a:prstGeom>
+          <a:solidFill>
+            <a:schemeClr val="tx1">
+              <a:alpha val="50000"/>
+            </a:schemeClr>
+          </a:solidFill>
+          <a:ln>
+            <a:noFill/>
+          </a:ln>
+        </p:spPr>
+        <p:style>
+          <a:lnRef idx="2">
+            <a:schemeClr val="accent1">
+              <a:shade val="50000"/>
+            </a:schemeClr>
+          </a:lnRef>
+          <a:fillRef idx="1">
+            <a:schemeClr val="accent1"/>
+          </a:fillRef>
+          <a:effectRef idx="0">
+            <a:schemeClr val="accent1"/>
+          </a:effectRef>
+          <a:fontRef idx="minor">
+            <a:schemeClr val="lt1"/>
+          </a:fontRef>
+        </p:style>
+        <p:txBody>
+          <a:bodyPr rtlCol="0" anchor="ctr"/>
+          <a:lstStyle/>
+          <a:p>
+            <a:pPr algn="ctr"/>
+            <a:endParaRPr lang="de-DE"/>
+          </a:p>
+        </p:txBody>
+      </p:sp>
+      <p:sp>
+        <p:nvSpPr>
+          <p:cNvPr id="22" name="Titelplatzhalter 21"/>
+          <p:cNvSpPr>
+            <a:spLocks noGrp="1"/>
+          </p:cNvSpPr>
+          <p:nvPr>
+            <p:ph type="title"/>
+          </p:nvPr>
+        </p:nvSpPr>
+        <p:spPr>
+          <a:xfrm>
+            <a:off x="1331640" y="0"/>
+            <a:ext cx="6480720" cy="1268760"/>
+          </a:xfrm>
+          <a:prstGeom prst="rect">
+            <a:avLst/>
+          </a:prstGeom>
+        </p:spPr>
+        <p:txBody>
+          <a:bodyPr vert="horz" anchor="b" anchorCtr="0">
+            <a:noAutofit/>
+            <a:scene3d>
+              <a:camera prst="orthographicFront"/>
+              <a:lightRig rig="soft" dir="t">
+                <a:rot lat="0" lon="0" rev="16800000"/>
+              </a:lightRig>
+            </a:scene3d>
+            <a:sp3d prstMaterial="softEdge">
+              <a:bevelT w="38100" h="38100"/>
+            </a:sp3d>
+          </a:bodyPr>
+          <a:lstStyle/>
+          <a:p>
+            <a:r>
+              <a:rPr kumimoji="0" lang="de-DE" dirty="0" smtClean="0"/>
+              <a:t>Titelmasterformat durch Klicken bearbeiten</a:t>
+            </a:r>
+            <a:endParaRPr kumimoji="0" lang="en-US" dirty="0"/>
+          </a:p>
+        </p:txBody>
+      </p:sp>
     </p:spTree>
   </p:cSld>
   <p:clrMap bg1="dk1" tx1="lt1" bg2="dk2" tx2="lt2" accent1="accent1" accent2="accent2" accent3="accent3" accent4="accent4" accent5="accent5" accent6="accent6" hlink="hlink" folHlink="folHlink"/>
@@ -5698,6 +5703,13 @@
     <p:sldLayoutId id="2147483670" r:id="rId10"/>
     <p:sldLayoutId id="2147483671" r:id="rId11"/>
   </p:sldLayoutIdLst>
+  <p:timing>
+    <p:tnLst>
+      <p:par>
+        <p:cTn id="1" dur="indefinite" restart="never" nodeType="tmRoot"/>
+      </p:par>
+    </p:tnLst>
+  </p:timing>
   <p:txStyles>
     <p:titleStyle>
       <a:lvl1pPr algn="ctr" rtl="0" eaLnBrk="1" latinLnBrk="0" hangingPunct="1">
@@ -5705,41 +5717,15 @@
           <a:spcPct val="0"/>
         </a:spcBef>
         <a:buNone/>
-        <a:defRPr kumimoji="0" sz="4100" b="1" kern="1200" cap="none" baseline="0">
+        <a:defRPr kumimoji="0" lang="en-US" sz="3600" b="1" kern="1200" cap="none" baseline="0" dirty="0">
           <a:ln w="6350">
             <a:noFill/>
           </a:ln>
-          <a:gradFill>
-            <a:gsLst>
-              <a:gs pos="0">
-                <a:schemeClr val="accent1">
-                  <a:tint val="73000"/>
-                  <a:satMod val="145000"/>
-                </a:schemeClr>
-              </a:gs>
-              <a:gs pos="73000">
-                <a:schemeClr val="accent1">
-                  <a:tint val="73000"/>
-                  <a:satMod val="145000"/>
-                </a:schemeClr>
-              </a:gs>
-              <a:gs pos="100000">
-                <a:schemeClr val="accent1">
-                  <a:tint val="83000"/>
-                  <a:satMod val="143000"/>
-                </a:schemeClr>
-              </a:gs>
-            </a:gsLst>
-            <a:lin ang="4800000" scaled="1"/>
-          </a:gradFill>
-          <a:effectLst>
-            <a:outerShdw blurRad="114300" dist="101600" dir="2700000" algn="tl" rotWithShape="0">
-              <a:srgbClr val="000000">
-                <a:alpha val="40000"/>
-              </a:srgbClr>
-            </a:outerShdw>
-          </a:effectLst>
-          <a:latin typeface="+mj-lt"/>
+          <a:solidFill>
+            <a:schemeClr val="bg1"/>
+          </a:solidFill>
+          <a:effectLst/>
+          <a:latin typeface="Arial Black" pitchFamily="34" charset="0"/>
           <a:ea typeface="+mj-ea"/>
           <a:cs typeface="+mj-cs"/>
         </a:defRPr>
@@ -6028,14 +6014,101 @@
           <a:chExt cx="0" cy="0"/>
         </a:xfrm>
       </p:grpSpPr>
+      <p:pic>
+        <p:nvPicPr>
+          <p:cNvPr id="6" name="Picture 2" descr="http://img696.imageshack.us/img696/6108/masseffectnormandy.jpg"/>
+          <p:cNvPicPr>
+            <a:picLocks noChangeAspect="1" noChangeArrowheads="1"/>
+          </p:cNvPicPr>
+          <p:nvPr/>
+        </p:nvPicPr>
+        <p:blipFill rotWithShape="1">
+          <a:blip r:embed="rId2">
+            <a:extLst>
+              <a:ext uri="{28A0092B-C50C-407E-A947-70E740481C1C}">
+                <a14:useLocalDpi xmlns:a14="http://schemas.microsoft.com/office/drawing/2010/main" val="0"/>
+              </a:ext>
+            </a:extLst>
+          </a:blip>
+          <a:srcRect l="24988"/>
+          <a:stretch/>
+        </p:blipFill>
+        <p:spPr bwMode="auto">
+          <a:xfrm>
+            <a:off x="0" y="-16739"/>
+            <a:ext cx="9143999" cy="6856850"/>
+          </a:xfrm>
+          <a:prstGeom prst="rect">
+            <a:avLst/>
+          </a:prstGeom>
+          <a:noFill/>
+          <a:extLst>
+            <a:ext uri="{909E8E84-426E-40DD-AFC4-6F175D3DCCD1}">
+              <a14:hiddenFill xmlns:a14="http://schemas.microsoft.com/office/drawing/2010/main">
+                <a:solidFill>
+                  <a:srgbClr val="FFFFFF"/>
+                </a:solidFill>
+              </a14:hiddenFill>
+            </a:ext>
+          </a:extLst>
+        </p:spPr>
+      </p:pic>
       <p:sp>
         <p:nvSpPr>
-          <p:cNvPr id="2" name="Titel 1"/>
+          <p:cNvPr id="9" name="Rechteck 8"/>
+          <p:cNvSpPr/>
+          <p:nvPr/>
+        </p:nvSpPr>
+        <p:spPr>
+          <a:xfrm>
+            <a:off x="1313638" y="0"/>
+            <a:ext cx="6516724" cy="1268760"/>
+          </a:xfrm>
+          <a:prstGeom prst="rect">
+            <a:avLst/>
+          </a:prstGeom>
+          <a:solidFill>
+            <a:schemeClr val="tx1">
+              <a:alpha val="50000"/>
+            </a:schemeClr>
+          </a:solidFill>
+          <a:ln>
+            <a:noFill/>
+          </a:ln>
+        </p:spPr>
+        <p:style>
+          <a:lnRef idx="2">
+            <a:schemeClr val="accent1">
+              <a:shade val="50000"/>
+            </a:schemeClr>
+          </a:lnRef>
+          <a:fillRef idx="1">
+            <a:schemeClr val="accent1"/>
+          </a:fillRef>
+          <a:effectRef idx="0">
+            <a:schemeClr val="accent1"/>
+          </a:effectRef>
+          <a:fontRef idx="minor">
+            <a:schemeClr val="lt1"/>
+          </a:fontRef>
+        </p:style>
+        <p:txBody>
+          <a:bodyPr rtlCol="0" anchor="ctr"/>
+          <a:lstStyle/>
+          <a:p>
+            <a:pPr algn="ctr"/>
+            <a:endParaRPr lang="de-DE"/>
+          </a:p>
+        </p:txBody>
+      </p:sp>
+      <p:sp>
+        <p:nvSpPr>
+          <p:cNvPr id="4" name="Titel 3"/>
           <p:cNvSpPr>
             <a:spLocks noGrp="1"/>
           </p:cNvSpPr>
           <p:nvPr>
-            <p:ph type="ctrTitle"/>
+            <p:ph type="title"/>
           </p:nvPr>
         </p:nvSpPr>
         <p:spPr/>
@@ -6043,39 +6116,35 @@
           <a:bodyPr/>
           <a:lstStyle/>
           <a:p>
+            <a:r>
+              <a:rPr lang="de-DE" dirty="0" smtClean="0"/>
+              <a:t>Space </a:t>
+            </a:r>
+            <a:r>
+              <a:rPr lang="de-DE" dirty="0" err="1" smtClean="0"/>
+              <a:t>Suppliers</a:t>
+            </a:r>
             <a:endParaRPr lang="de-DE" dirty="0"/>
-          </a:p>
-        </p:txBody>
-      </p:sp>
-      <p:sp>
-        <p:nvSpPr>
-          <p:cNvPr id="3" name="Untertitel 2"/>
-          <p:cNvSpPr>
-            <a:spLocks noGrp="1"/>
-          </p:cNvSpPr>
-          <p:nvPr>
-            <p:ph type="subTitle" idx="1"/>
-          </p:nvPr>
-        </p:nvSpPr>
-        <p:spPr/>
-        <p:txBody>
-          <a:bodyPr/>
-          <a:lstStyle/>
-          <a:p>
-            <a:endParaRPr lang="de-DE"/>
           </a:p>
         </p:txBody>
       </p:sp>
     </p:spTree>
     <p:extLst>
       <p:ext uri="{BB962C8B-B14F-4D97-AF65-F5344CB8AC3E}">
-        <p14:creationId xmlns:p14="http://schemas.microsoft.com/office/powerpoint/2010/main" val="277824987"/>
+        <p14:creationId xmlns:p14="http://schemas.microsoft.com/office/powerpoint/2010/main" val="1584145063"/>
       </p:ext>
     </p:extLst>
   </p:cSld>
   <p:clrMapOvr>
     <a:masterClrMapping/>
   </p:clrMapOvr>
+  <p:timing>
+    <p:tnLst>
+      <p:par>
+        <p:cTn id="1" dur="indefinite" restart="never" nodeType="tmRoot"/>
+      </p:par>
+    </p:tnLst>
+  </p:timing>
 </p:sld>
 </file>
 
@@ -6098,7 +6167,7 @@
       </p:grpSpPr>
       <p:sp>
         <p:nvSpPr>
-          <p:cNvPr id="2" name="Titel 1"/>
+          <p:cNvPr id="3" name="Titel 2"/>
           <p:cNvSpPr>
             <a:spLocks noGrp="1"/>
           </p:cNvSpPr>
@@ -6121,22 +6190,21 @@
       </p:sp>
       <p:graphicFrame>
         <p:nvGraphicFramePr>
-          <p:cNvPr id="6" name="Inhaltsplatzhalter 5"/>
+          <p:cNvPr id="4" name="Inhaltsplatzhalter 5"/>
           <p:cNvGraphicFramePr>
-            <a:graphicFrameLocks noGrp="1"/>
+            <a:graphicFrameLocks/>
           </p:cNvGraphicFramePr>
           <p:nvPr>
-            <p:ph idx="1"/>
             <p:extLst>
               <p:ext uri="{D42A27DB-BD31-4B8C-83A1-F6EECF244321}">
-                <p14:modId xmlns:p14="http://schemas.microsoft.com/office/powerpoint/2010/main" val="3098775882"/>
+                <p14:modId xmlns:p14="http://schemas.microsoft.com/office/powerpoint/2010/main" val="3103798631"/>
               </p:ext>
             </p:extLst>
           </p:nvPr>
         </p:nvGraphicFramePr>
         <p:xfrm>
-          <a:off x="457200" y="1600200"/>
-          <a:ext cx="8229600" cy="4708525"/>
+          <a:off x="1002432" y="1600200"/>
+          <a:ext cx="7139136" cy="4708525"/>
         </p:xfrm>
         <a:graphic>
           <a:graphicData uri="http://schemas.openxmlformats.org/drawingml/2006/diagram">
@@ -6147,13 +6215,20 @@
     </p:spTree>
     <p:extLst>
       <p:ext uri="{BB962C8B-B14F-4D97-AF65-F5344CB8AC3E}">
-        <p14:creationId xmlns:p14="http://schemas.microsoft.com/office/powerpoint/2010/main" val="2890488602"/>
+        <p14:creationId xmlns:p14="http://schemas.microsoft.com/office/powerpoint/2010/main" val="569813315"/>
       </p:ext>
     </p:extLst>
   </p:cSld>
   <p:clrMapOvr>
     <a:masterClrMapping/>
   </p:clrMapOvr>
+  <p:timing>
+    <p:tnLst>
+      <p:par>
+        <p:cTn id="1" dur="indefinite" restart="never" nodeType="tmRoot"/>
+      </p:par>
+    </p:tnLst>
+  </p:timing>
 </p:sld>
 </file>
 
@@ -6176,21 +6251,979 @@
       </p:grpSpPr>
       <p:sp>
         <p:nvSpPr>
-          <p:cNvPr id="16" name="Rechteck 15"/>
+          <p:cNvPr id="3" name="Titel 2"/>
+          <p:cNvSpPr>
+            <a:spLocks noGrp="1"/>
+          </p:cNvSpPr>
+          <p:nvPr>
+            <p:ph type="title"/>
+          </p:nvPr>
+        </p:nvSpPr>
+        <p:spPr/>
+        <p:txBody>
+          <a:bodyPr/>
+          <a:lstStyle/>
+          <a:p>
+            <a:r>
+              <a:rPr lang="de-DE" dirty="0" smtClean="0"/>
+              <a:t>Aufbau</a:t>
+            </a:r>
+            <a:endParaRPr lang="de-DE" dirty="0"/>
+          </a:p>
+        </p:txBody>
+      </p:sp>
+      <p:grpSp>
+        <p:nvGrpSpPr>
+          <p:cNvPr id="4" name="Gruppieren 3"/>
+          <p:cNvGrpSpPr/>
+          <p:nvPr/>
+        </p:nvGrpSpPr>
+        <p:grpSpPr>
+          <a:xfrm>
+            <a:off x="1475656" y="1484784"/>
+            <a:ext cx="6192688" cy="1872208"/>
+            <a:chOff x="683568" y="1196752"/>
+            <a:chExt cx="6192688" cy="1872208"/>
+          </a:xfrm>
+        </p:grpSpPr>
+        <p:sp>
+          <p:nvSpPr>
+            <p:cNvPr id="5" name="Rechteck 4"/>
+            <p:cNvSpPr/>
+            <p:nvPr/>
+          </p:nvSpPr>
+          <p:spPr>
+            <a:xfrm>
+              <a:off x="683568" y="1196752"/>
+              <a:ext cx="6192688" cy="1872208"/>
+            </a:xfrm>
+            <a:prstGeom prst="rect">
+              <a:avLst/>
+            </a:prstGeom>
+            <a:solidFill>
+              <a:schemeClr val="accent1">
+                <a:alpha val="50000"/>
+              </a:schemeClr>
+            </a:solidFill>
+          </p:spPr>
+          <p:style>
+            <a:lnRef idx="3">
+              <a:schemeClr val="lt1"/>
+            </a:lnRef>
+            <a:fillRef idx="1">
+              <a:schemeClr val="accent1"/>
+            </a:fillRef>
+            <a:effectRef idx="1">
+              <a:schemeClr val="accent1"/>
+            </a:effectRef>
+            <a:fontRef idx="minor">
+              <a:schemeClr val="lt1"/>
+            </a:fontRef>
+          </p:style>
+          <p:txBody>
+            <a:bodyPr rtlCol="0" anchor="t" anchorCtr="0"/>
+            <a:lstStyle/>
+            <a:p>
+              <a:r>
+                <a:rPr lang="de-DE" sz="2000" b="1" dirty="0" smtClean="0">
+                  <a:solidFill>
+                    <a:schemeClr val="tx1"/>
+                  </a:solidFill>
+                </a:rPr>
+                <a:t>Unternehmen</a:t>
+              </a:r>
+              <a:endParaRPr lang="de-DE" sz="2000" b="1" dirty="0">
+                <a:solidFill>
+                  <a:schemeClr val="tx1"/>
+                </a:solidFill>
+              </a:endParaRPr>
+            </a:p>
+          </p:txBody>
+        </p:sp>
+        <p:sp>
+          <p:nvSpPr>
+            <p:cNvPr id="6" name="Rechteck 5"/>
+            <p:cNvSpPr/>
+            <p:nvPr/>
+          </p:nvSpPr>
+          <p:spPr>
+            <a:xfrm>
+              <a:off x="2915816" y="1340768"/>
+              <a:ext cx="1728192" cy="432048"/>
+            </a:xfrm>
+            <a:prstGeom prst="rect">
+              <a:avLst/>
+            </a:prstGeom>
+          </p:spPr>
+          <p:style>
+            <a:lnRef idx="2">
+              <a:schemeClr val="accent1">
+                <a:shade val="50000"/>
+              </a:schemeClr>
+            </a:lnRef>
+            <a:fillRef idx="1">
+              <a:schemeClr val="accent1"/>
+            </a:fillRef>
+            <a:effectRef idx="0">
+              <a:schemeClr val="accent1"/>
+            </a:effectRef>
+            <a:fontRef idx="minor">
+              <a:schemeClr val="lt1"/>
+            </a:fontRef>
+          </p:style>
+          <p:txBody>
+            <a:bodyPr rtlCol="0" anchor="ctr"/>
+            <a:lstStyle/>
+            <a:p>
+              <a:pPr algn="ctr"/>
+              <a:r>
+                <a:rPr lang="de-DE" dirty="0" smtClean="0">
+                  <a:solidFill>
+                    <a:schemeClr val="bg1"/>
+                  </a:solidFill>
+                </a:rPr>
+                <a:t>Management</a:t>
+              </a:r>
+              <a:endParaRPr lang="de-DE" dirty="0">
+                <a:solidFill>
+                  <a:schemeClr val="bg1"/>
+                </a:solidFill>
+              </a:endParaRPr>
+            </a:p>
+          </p:txBody>
+        </p:sp>
+        <p:sp>
+          <p:nvSpPr>
+            <p:cNvPr id="7" name="Rechteck 6"/>
+            <p:cNvSpPr/>
+            <p:nvPr/>
+          </p:nvSpPr>
+          <p:spPr>
+            <a:xfrm>
+              <a:off x="827584" y="1916832"/>
+              <a:ext cx="1728192" cy="432048"/>
+            </a:xfrm>
+            <a:prstGeom prst="rect">
+              <a:avLst/>
+            </a:prstGeom>
+          </p:spPr>
+          <p:style>
+            <a:lnRef idx="2">
+              <a:schemeClr val="accent1">
+                <a:shade val="50000"/>
+              </a:schemeClr>
+            </a:lnRef>
+            <a:fillRef idx="1">
+              <a:schemeClr val="accent1"/>
+            </a:fillRef>
+            <a:effectRef idx="0">
+              <a:schemeClr val="accent1"/>
+            </a:effectRef>
+            <a:fontRef idx="minor">
+              <a:schemeClr val="lt1"/>
+            </a:fontRef>
+          </p:style>
+          <p:txBody>
+            <a:bodyPr rtlCol="0" anchor="ctr"/>
+            <a:lstStyle/>
+            <a:p>
+              <a:pPr algn="ctr"/>
+              <a:r>
+                <a:rPr lang="de-DE" dirty="0" smtClean="0">
+                  <a:solidFill>
+                    <a:schemeClr val="bg1"/>
+                  </a:solidFill>
+                </a:rPr>
+                <a:t>F&amp;E</a:t>
+              </a:r>
+              <a:endParaRPr lang="de-DE" dirty="0">
+                <a:solidFill>
+                  <a:schemeClr val="bg1"/>
+                </a:solidFill>
+              </a:endParaRPr>
+            </a:p>
+          </p:txBody>
+        </p:sp>
+        <p:sp>
+          <p:nvSpPr>
+            <p:cNvPr id="8" name="Rechteck 7"/>
+            <p:cNvSpPr/>
+            <p:nvPr/>
+          </p:nvSpPr>
+          <p:spPr>
+            <a:xfrm>
+              <a:off x="2915816" y="1916832"/>
+              <a:ext cx="1728192" cy="432048"/>
+            </a:xfrm>
+            <a:prstGeom prst="rect">
+              <a:avLst/>
+            </a:prstGeom>
+          </p:spPr>
+          <p:style>
+            <a:lnRef idx="2">
+              <a:schemeClr val="accent1">
+                <a:shade val="50000"/>
+              </a:schemeClr>
+            </a:lnRef>
+            <a:fillRef idx="1">
+              <a:schemeClr val="accent1"/>
+            </a:fillRef>
+            <a:effectRef idx="0">
+              <a:schemeClr val="accent1"/>
+            </a:effectRef>
+            <a:fontRef idx="minor">
+              <a:schemeClr val="lt1"/>
+            </a:fontRef>
+          </p:style>
+          <p:txBody>
+            <a:bodyPr rtlCol="0" anchor="ctr"/>
+            <a:lstStyle/>
+            <a:p>
+              <a:pPr algn="ctr"/>
+              <a:r>
+                <a:rPr lang="de-DE" dirty="0" smtClean="0">
+                  <a:solidFill>
+                    <a:schemeClr val="bg1"/>
+                  </a:solidFill>
+                </a:rPr>
+                <a:t>HR</a:t>
+              </a:r>
+            </a:p>
+          </p:txBody>
+        </p:sp>
+        <p:sp>
+          <p:nvSpPr>
+            <p:cNvPr id="9" name="Rechteck 8"/>
+            <p:cNvSpPr/>
+            <p:nvPr/>
+          </p:nvSpPr>
+          <p:spPr>
+            <a:xfrm>
+              <a:off x="827584" y="2492896"/>
+              <a:ext cx="1728192" cy="432048"/>
+            </a:xfrm>
+            <a:prstGeom prst="rect">
+              <a:avLst/>
+            </a:prstGeom>
+          </p:spPr>
+          <p:style>
+            <a:lnRef idx="2">
+              <a:schemeClr val="accent1">
+                <a:shade val="50000"/>
+              </a:schemeClr>
+            </a:lnRef>
+            <a:fillRef idx="1">
+              <a:schemeClr val="accent1"/>
+            </a:fillRef>
+            <a:effectRef idx="0">
+              <a:schemeClr val="accent1"/>
+            </a:effectRef>
+            <a:fontRef idx="minor">
+              <a:schemeClr val="lt1"/>
+            </a:fontRef>
+          </p:style>
+          <p:txBody>
+            <a:bodyPr rtlCol="0" anchor="ctr"/>
+            <a:lstStyle/>
+            <a:p>
+              <a:pPr algn="ctr"/>
+              <a:r>
+                <a:rPr lang="de-DE" dirty="0" smtClean="0">
+                  <a:solidFill>
+                    <a:schemeClr val="bg1"/>
+                  </a:solidFill>
+                </a:rPr>
+                <a:t>Einkauf</a:t>
+              </a:r>
+            </a:p>
+          </p:txBody>
+        </p:sp>
+        <p:sp>
+          <p:nvSpPr>
+            <p:cNvPr id="10" name="Rechteck 9"/>
+            <p:cNvSpPr/>
+            <p:nvPr/>
+          </p:nvSpPr>
+          <p:spPr>
+            <a:xfrm>
+              <a:off x="2915816" y="2492896"/>
+              <a:ext cx="1728192" cy="432048"/>
+            </a:xfrm>
+            <a:prstGeom prst="rect">
+              <a:avLst/>
+            </a:prstGeom>
+          </p:spPr>
+          <p:style>
+            <a:lnRef idx="2">
+              <a:schemeClr val="accent1">
+                <a:shade val="50000"/>
+              </a:schemeClr>
+            </a:lnRef>
+            <a:fillRef idx="1">
+              <a:schemeClr val="accent1"/>
+            </a:fillRef>
+            <a:effectRef idx="0">
+              <a:schemeClr val="accent1"/>
+            </a:effectRef>
+            <a:fontRef idx="minor">
+              <a:schemeClr val="lt1"/>
+            </a:fontRef>
+          </p:style>
+          <p:txBody>
+            <a:bodyPr rtlCol="0" anchor="ctr"/>
+            <a:lstStyle/>
+            <a:p>
+              <a:pPr algn="ctr"/>
+              <a:r>
+                <a:rPr lang="de-DE" dirty="0" smtClean="0">
+                  <a:solidFill>
+                    <a:schemeClr val="bg1"/>
+                  </a:solidFill>
+                </a:rPr>
+                <a:t>Produktion</a:t>
+              </a:r>
+            </a:p>
+          </p:txBody>
+        </p:sp>
+        <p:sp>
+          <p:nvSpPr>
+            <p:cNvPr id="11" name="Rechteck 10"/>
+            <p:cNvSpPr/>
+            <p:nvPr/>
+          </p:nvSpPr>
+          <p:spPr>
+            <a:xfrm>
+              <a:off x="5004048" y="2492896"/>
+              <a:ext cx="1728192" cy="432048"/>
+            </a:xfrm>
+            <a:prstGeom prst="rect">
+              <a:avLst/>
+            </a:prstGeom>
+          </p:spPr>
+          <p:style>
+            <a:lnRef idx="2">
+              <a:schemeClr val="accent1">
+                <a:shade val="50000"/>
+              </a:schemeClr>
+            </a:lnRef>
+            <a:fillRef idx="1">
+              <a:schemeClr val="accent1"/>
+            </a:fillRef>
+            <a:effectRef idx="0">
+              <a:schemeClr val="accent1"/>
+            </a:effectRef>
+            <a:fontRef idx="minor">
+              <a:schemeClr val="lt1"/>
+            </a:fontRef>
+          </p:style>
+          <p:txBody>
+            <a:bodyPr rtlCol="0" anchor="ctr"/>
+            <a:lstStyle/>
+            <a:p>
+              <a:pPr algn="ctr"/>
+              <a:r>
+                <a:rPr lang="de-DE" dirty="0" smtClean="0">
+                  <a:solidFill>
+                    <a:schemeClr val="bg1"/>
+                  </a:solidFill>
+                </a:rPr>
+                <a:t>Vertrieb</a:t>
+              </a:r>
+            </a:p>
+          </p:txBody>
+        </p:sp>
+        <p:sp>
+          <p:nvSpPr>
+            <p:cNvPr id="12" name="Rechteck 11"/>
+            <p:cNvSpPr/>
+            <p:nvPr/>
+          </p:nvSpPr>
+          <p:spPr>
+            <a:xfrm>
+              <a:off x="5004048" y="1916832"/>
+              <a:ext cx="1728192" cy="432048"/>
+            </a:xfrm>
+            <a:prstGeom prst="rect">
+              <a:avLst/>
+            </a:prstGeom>
+          </p:spPr>
+          <p:style>
+            <a:lnRef idx="2">
+              <a:schemeClr val="accent1">
+                <a:shade val="50000"/>
+              </a:schemeClr>
+            </a:lnRef>
+            <a:fillRef idx="1">
+              <a:schemeClr val="accent1"/>
+            </a:fillRef>
+            <a:effectRef idx="0">
+              <a:schemeClr val="accent1"/>
+            </a:effectRef>
+            <a:fontRef idx="minor">
+              <a:schemeClr val="lt1"/>
+            </a:fontRef>
+          </p:style>
+          <p:txBody>
+            <a:bodyPr rtlCol="0" anchor="ctr"/>
+            <a:lstStyle/>
+            <a:p>
+              <a:pPr algn="ctr"/>
+              <a:r>
+                <a:rPr lang="de-DE" dirty="0" smtClean="0">
+                  <a:solidFill>
+                    <a:schemeClr val="bg1"/>
+                  </a:solidFill>
+                </a:rPr>
+                <a:t>Finanzen</a:t>
+              </a:r>
+            </a:p>
+          </p:txBody>
+        </p:sp>
+        <p:cxnSp>
+          <p:nvCxnSpPr>
+            <p:cNvPr id="13" name="Gerade Verbindung mit Pfeil 12"/>
+            <p:cNvCxnSpPr>
+              <a:stCxn id="9" idx="3"/>
+              <a:endCxn id="10" idx="1"/>
+            </p:cNvCxnSpPr>
+            <p:nvPr/>
+          </p:nvCxnSpPr>
+          <p:spPr>
+            <a:xfrm>
+              <a:off x="2555776" y="2708920"/>
+              <a:ext cx="360040" cy="0"/>
+            </a:xfrm>
+            <a:prstGeom prst="straightConnector1">
+              <a:avLst/>
+            </a:prstGeom>
+            <a:ln w="38100">
+              <a:solidFill>
+                <a:schemeClr val="accent1"/>
+              </a:solidFill>
+              <a:headEnd type="none" w="med" len="med"/>
+              <a:tailEnd type="triangle" w="med" len="med"/>
+            </a:ln>
+          </p:spPr>
+          <p:style>
+            <a:lnRef idx="1">
+              <a:schemeClr val="accent1"/>
+            </a:lnRef>
+            <a:fillRef idx="0">
+              <a:schemeClr val="accent1"/>
+            </a:fillRef>
+            <a:effectRef idx="0">
+              <a:schemeClr val="accent1"/>
+            </a:effectRef>
+            <a:fontRef idx="minor">
+              <a:schemeClr val="tx1"/>
+            </a:fontRef>
+          </p:style>
+        </p:cxnSp>
+        <p:cxnSp>
+          <p:nvCxnSpPr>
+            <p:cNvPr id="14" name="Gerade Verbindung mit Pfeil 13"/>
+            <p:cNvCxnSpPr/>
+            <p:nvPr/>
+          </p:nvCxnSpPr>
+          <p:spPr>
+            <a:xfrm>
+              <a:off x="4644008" y="2708920"/>
+              <a:ext cx="360040" cy="0"/>
+            </a:xfrm>
+            <a:prstGeom prst="straightConnector1">
+              <a:avLst/>
+            </a:prstGeom>
+            <a:ln w="38100">
+              <a:solidFill>
+                <a:schemeClr val="accent1"/>
+              </a:solidFill>
+              <a:headEnd type="none" w="med" len="med"/>
+              <a:tailEnd type="triangle" w="med" len="med"/>
+            </a:ln>
+          </p:spPr>
+          <p:style>
+            <a:lnRef idx="1">
+              <a:schemeClr val="accent1"/>
+            </a:lnRef>
+            <a:fillRef idx="0">
+              <a:schemeClr val="accent1"/>
+            </a:fillRef>
+            <a:effectRef idx="0">
+              <a:schemeClr val="accent1"/>
+            </a:effectRef>
+            <a:fontRef idx="minor">
+              <a:schemeClr val="tx1"/>
+            </a:fontRef>
+          </p:style>
+        </p:cxnSp>
+      </p:grpSp>
+      <p:grpSp>
+        <p:nvGrpSpPr>
+          <p:cNvPr id="15" name="Gruppieren 14"/>
+          <p:cNvGrpSpPr/>
+          <p:nvPr/>
+        </p:nvGrpSpPr>
+        <p:grpSpPr>
+          <a:xfrm>
+            <a:off x="1475656" y="3933056"/>
+            <a:ext cx="2232248" cy="2736304"/>
+            <a:chOff x="251520" y="3861048"/>
+            <a:chExt cx="2232248" cy="2736304"/>
+          </a:xfrm>
+        </p:grpSpPr>
+        <p:sp>
+          <p:nvSpPr>
+            <p:cNvPr id="16" name="Rechteck 15"/>
+            <p:cNvSpPr/>
+            <p:nvPr/>
+          </p:nvSpPr>
+          <p:spPr>
+            <a:xfrm>
+              <a:off x="251520" y="3861048"/>
+              <a:ext cx="2232248" cy="2736304"/>
+            </a:xfrm>
+            <a:prstGeom prst="rect">
+              <a:avLst/>
+            </a:prstGeom>
+            <a:solidFill>
+              <a:schemeClr val="accent1">
+                <a:alpha val="50000"/>
+              </a:schemeClr>
+            </a:solidFill>
+          </p:spPr>
+          <p:style>
+            <a:lnRef idx="3">
+              <a:schemeClr val="lt1"/>
+            </a:lnRef>
+            <a:fillRef idx="1">
+              <a:schemeClr val="accent1"/>
+            </a:fillRef>
+            <a:effectRef idx="1">
+              <a:schemeClr val="accent1"/>
+            </a:effectRef>
+            <a:fontRef idx="minor">
+              <a:schemeClr val="lt1"/>
+            </a:fontRef>
+          </p:style>
+          <p:txBody>
+            <a:bodyPr rtlCol="0" anchor="t" anchorCtr="0"/>
+            <a:lstStyle/>
+            <a:p>
+              <a:r>
+                <a:rPr lang="de-DE" b="1" dirty="0" smtClean="0">
+                  <a:solidFill>
+                    <a:schemeClr val="tx1"/>
+                  </a:solidFill>
+                </a:rPr>
+                <a:t>Güter &amp; HR-Markt</a:t>
+              </a:r>
+              <a:endParaRPr lang="de-DE" b="1" dirty="0">
+                <a:solidFill>
+                  <a:schemeClr val="tx1"/>
+                </a:solidFill>
+              </a:endParaRPr>
+            </a:p>
+          </p:txBody>
+        </p:sp>
+        <p:sp>
+          <p:nvSpPr>
+            <p:cNvPr id="17" name="Rechteck 16"/>
+            <p:cNvSpPr/>
+            <p:nvPr/>
+          </p:nvSpPr>
+          <p:spPr>
+            <a:xfrm>
+              <a:off x="395536" y="4293096"/>
+              <a:ext cx="1728192" cy="432048"/>
+            </a:xfrm>
+            <a:prstGeom prst="rect">
+              <a:avLst/>
+            </a:prstGeom>
+          </p:spPr>
+          <p:style>
+            <a:lnRef idx="2">
+              <a:schemeClr val="accent1">
+                <a:shade val="50000"/>
+              </a:schemeClr>
+            </a:lnRef>
+            <a:fillRef idx="1">
+              <a:schemeClr val="accent1"/>
+            </a:fillRef>
+            <a:effectRef idx="0">
+              <a:schemeClr val="accent1"/>
+            </a:effectRef>
+            <a:fontRef idx="minor">
+              <a:schemeClr val="lt1"/>
+            </a:fontRef>
+          </p:style>
+          <p:txBody>
+            <a:bodyPr rtlCol="0" anchor="ctr"/>
+            <a:lstStyle/>
+            <a:p>
+              <a:pPr algn="ctr"/>
+              <a:r>
+                <a:rPr lang="de-DE" dirty="0" smtClean="0">
+                  <a:solidFill>
+                    <a:schemeClr val="bg1"/>
+                  </a:solidFill>
+                </a:rPr>
+                <a:t>Rohstoffe</a:t>
+              </a:r>
+              <a:endParaRPr lang="de-DE" dirty="0" smtClean="0">
+                <a:solidFill>
+                  <a:schemeClr val="bg1"/>
+                </a:solidFill>
+              </a:endParaRPr>
+            </a:p>
+          </p:txBody>
+        </p:sp>
+        <p:sp>
+          <p:nvSpPr>
+            <p:cNvPr id="18" name="Rechteck 17"/>
+            <p:cNvSpPr/>
+            <p:nvPr/>
+          </p:nvSpPr>
+          <p:spPr>
+            <a:xfrm>
+              <a:off x="395536" y="4869160"/>
+              <a:ext cx="1728192" cy="432048"/>
+            </a:xfrm>
+            <a:prstGeom prst="rect">
+              <a:avLst/>
+            </a:prstGeom>
+          </p:spPr>
+          <p:style>
+            <a:lnRef idx="2">
+              <a:schemeClr val="accent1">
+                <a:shade val="50000"/>
+              </a:schemeClr>
+            </a:lnRef>
+            <a:fillRef idx="1">
+              <a:schemeClr val="accent1"/>
+            </a:fillRef>
+            <a:effectRef idx="0">
+              <a:schemeClr val="accent1"/>
+            </a:effectRef>
+            <a:fontRef idx="minor">
+              <a:schemeClr val="lt1"/>
+            </a:fontRef>
+          </p:style>
+          <p:txBody>
+            <a:bodyPr rtlCol="0" anchor="ctr"/>
+            <a:lstStyle/>
+            <a:p>
+              <a:pPr algn="ctr"/>
+              <a:r>
+                <a:rPr lang="de-DE" dirty="0" smtClean="0">
+                  <a:solidFill>
+                    <a:schemeClr val="bg1"/>
+                  </a:solidFill>
+                </a:rPr>
+                <a:t>Arbeitsgerät</a:t>
+              </a:r>
+              <a:endParaRPr lang="de-DE" dirty="0" smtClean="0">
+                <a:solidFill>
+                  <a:schemeClr val="bg1"/>
+                </a:solidFill>
+              </a:endParaRPr>
+            </a:p>
+          </p:txBody>
+        </p:sp>
+        <p:sp>
+          <p:nvSpPr>
+            <p:cNvPr id="19" name="Rechteck 18"/>
+            <p:cNvSpPr/>
+            <p:nvPr/>
+          </p:nvSpPr>
+          <p:spPr>
+            <a:xfrm>
+              <a:off x="395536" y="5445224"/>
+              <a:ext cx="1728192" cy="432048"/>
+            </a:xfrm>
+            <a:prstGeom prst="rect">
+              <a:avLst/>
+            </a:prstGeom>
+          </p:spPr>
+          <p:style>
+            <a:lnRef idx="2">
+              <a:schemeClr val="accent1">
+                <a:shade val="50000"/>
+              </a:schemeClr>
+            </a:lnRef>
+            <a:fillRef idx="1">
+              <a:schemeClr val="accent1"/>
+            </a:fillRef>
+            <a:effectRef idx="0">
+              <a:schemeClr val="accent1"/>
+            </a:effectRef>
+            <a:fontRef idx="minor">
+              <a:schemeClr val="lt1"/>
+            </a:fontRef>
+          </p:style>
+          <p:txBody>
+            <a:bodyPr rtlCol="0" anchor="ctr"/>
+            <a:lstStyle/>
+            <a:p>
+              <a:pPr algn="ctr"/>
+              <a:r>
+                <a:rPr lang="de-DE" dirty="0" smtClean="0">
+                  <a:solidFill>
+                    <a:schemeClr val="bg1"/>
+                  </a:solidFill>
+                </a:rPr>
+                <a:t>Raumschiffe</a:t>
+              </a:r>
+              <a:endParaRPr lang="de-DE" dirty="0" smtClean="0">
+                <a:solidFill>
+                  <a:schemeClr val="bg1"/>
+                </a:solidFill>
+              </a:endParaRPr>
+            </a:p>
+          </p:txBody>
+        </p:sp>
+        <p:sp>
+          <p:nvSpPr>
+            <p:cNvPr id="20" name="Rechteck 19"/>
+            <p:cNvSpPr/>
+            <p:nvPr/>
+          </p:nvSpPr>
+          <p:spPr>
+            <a:xfrm>
+              <a:off x="395536" y="6021288"/>
+              <a:ext cx="1728192" cy="432048"/>
+            </a:xfrm>
+            <a:prstGeom prst="rect">
+              <a:avLst/>
+            </a:prstGeom>
+          </p:spPr>
+          <p:style>
+            <a:lnRef idx="2">
+              <a:schemeClr val="accent1">
+                <a:shade val="50000"/>
+              </a:schemeClr>
+            </a:lnRef>
+            <a:fillRef idx="1">
+              <a:schemeClr val="accent1"/>
+            </a:fillRef>
+            <a:effectRef idx="0">
+              <a:schemeClr val="accent1"/>
+            </a:effectRef>
+            <a:fontRef idx="minor">
+              <a:schemeClr val="lt1"/>
+            </a:fontRef>
+          </p:style>
+          <p:txBody>
+            <a:bodyPr rtlCol="0" anchor="ctr"/>
+            <a:lstStyle/>
+            <a:p>
+              <a:pPr algn="ctr"/>
+              <a:r>
+                <a:rPr lang="de-DE" dirty="0" smtClean="0">
+                  <a:solidFill>
+                    <a:schemeClr val="bg1"/>
+                  </a:solidFill>
+                </a:rPr>
+                <a:t>Personal</a:t>
+              </a:r>
+              <a:endParaRPr lang="de-DE" dirty="0" smtClean="0">
+                <a:solidFill>
+                  <a:schemeClr val="bg1"/>
+                </a:solidFill>
+              </a:endParaRPr>
+            </a:p>
+          </p:txBody>
+        </p:sp>
+      </p:grpSp>
+      <p:grpSp>
+        <p:nvGrpSpPr>
+          <p:cNvPr id="21" name="Gruppieren 20"/>
+          <p:cNvGrpSpPr/>
+          <p:nvPr/>
+        </p:nvGrpSpPr>
+        <p:grpSpPr>
+          <a:xfrm>
+            <a:off x="5652120" y="3933056"/>
+            <a:ext cx="2016224" cy="1584176"/>
+            <a:chOff x="251520" y="3861048"/>
+            <a:chExt cx="2016224" cy="1584176"/>
+          </a:xfrm>
+        </p:grpSpPr>
+        <p:sp>
+          <p:nvSpPr>
+            <p:cNvPr id="22" name="Rechteck 21"/>
+            <p:cNvSpPr/>
+            <p:nvPr/>
+          </p:nvSpPr>
+          <p:spPr>
+            <a:xfrm>
+              <a:off x="251520" y="3861048"/>
+              <a:ext cx="2016224" cy="1584176"/>
+            </a:xfrm>
+            <a:prstGeom prst="rect">
+              <a:avLst/>
+            </a:prstGeom>
+            <a:solidFill>
+              <a:schemeClr val="accent1">
+                <a:alpha val="50000"/>
+              </a:schemeClr>
+            </a:solidFill>
+          </p:spPr>
+          <p:style>
+            <a:lnRef idx="3">
+              <a:schemeClr val="lt1"/>
+            </a:lnRef>
+            <a:fillRef idx="1">
+              <a:schemeClr val="accent1"/>
+            </a:fillRef>
+            <a:effectRef idx="1">
+              <a:schemeClr val="accent1"/>
+            </a:effectRef>
+            <a:fontRef idx="minor">
+              <a:schemeClr val="lt1"/>
+            </a:fontRef>
+          </p:style>
+          <p:txBody>
+            <a:bodyPr rtlCol="0" anchor="t" anchorCtr="0"/>
+            <a:lstStyle/>
+            <a:p>
+              <a:r>
+                <a:rPr lang="de-DE" b="1" dirty="0" smtClean="0">
+                  <a:solidFill>
+                    <a:schemeClr val="tx1"/>
+                  </a:solidFill>
+                </a:rPr>
+                <a:t>Geldmarkt</a:t>
+              </a:r>
+              <a:endParaRPr lang="de-DE" b="1" dirty="0">
+                <a:solidFill>
+                  <a:schemeClr val="tx1"/>
+                </a:solidFill>
+              </a:endParaRPr>
+            </a:p>
+          </p:txBody>
+        </p:sp>
+        <p:sp>
+          <p:nvSpPr>
+            <p:cNvPr id="23" name="Rechteck 22"/>
+            <p:cNvSpPr/>
+            <p:nvPr/>
+          </p:nvSpPr>
+          <p:spPr>
+            <a:xfrm>
+              <a:off x="395536" y="4293096"/>
+              <a:ext cx="1728192" cy="432048"/>
+            </a:xfrm>
+            <a:prstGeom prst="rect">
+              <a:avLst/>
+            </a:prstGeom>
+          </p:spPr>
+          <p:style>
+            <a:lnRef idx="2">
+              <a:schemeClr val="accent1">
+                <a:shade val="50000"/>
+              </a:schemeClr>
+            </a:lnRef>
+            <a:fillRef idx="1">
+              <a:schemeClr val="accent1"/>
+            </a:fillRef>
+            <a:effectRef idx="0">
+              <a:schemeClr val="accent1"/>
+            </a:effectRef>
+            <a:fontRef idx="minor">
+              <a:schemeClr val="lt1"/>
+            </a:fontRef>
+          </p:style>
+          <p:txBody>
+            <a:bodyPr rtlCol="0" anchor="ctr"/>
+            <a:lstStyle/>
+            <a:p>
+              <a:pPr algn="ctr"/>
+              <a:r>
+                <a:rPr lang="de-DE" dirty="0" smtClean="0">
+                  <a:solidFill>
+                    <a:schemeClr val="bg1"/>
+                  </a:solidFill>
+                </a:rPr>
+                <a:t>Einlagen</a:t>
+              </a:r>
+              <a:endParaRPr lang="de-DE" dirty="0" smtClean="0">
+                <a:solidFill>
+                  <a:schemeClr val="bg1"/>
+                </a:solidFill>
+              </a:endParaRPr>
+            </a:p>
+          </p:txBody>
+        </p:sp>
+        <p:sp>
+          <p:nvSpPr>
+            <p:cNvPr id="24" name="Rechteck 23"/>
+            <p:cNvSpPr/>
+            <p:nvPr/>
+          </p:nvSpPr>
+          <p:spPr>
+            <a:xfrm>
+              <a:off x="395536" y="4869160"/>
+              <a:ext cx="1728192" cy="432048"/>
+            </a:xfrm>
+            <a:prstGeom prst="rect">
+              <a:avLst/>
+            </a:prstGeom>
+          </p:spPr>
+          <p:style>
+            <a:lnRef idx="2">
+              <a:schemeClr val="accent1">
+                <a:shade val="50000"/>
+              </a:schemeClr>
+            </a:lnRef>
+            <a:fillRef idx="1">
+              <a:schemeClr val="accent1"/>
+            </a:fillRef>
+            <a:effectRef idx="0">
+              <a:schemeClr val="accent1"/>
+            </a:effectRef>
+            <a:fontRef idx="minor">
+              <a:schemeClr val="lt1"/>
+            </a:fontRef>
+          </p:style>
+          <p:txBody>
+            <a:bodyPr rtlCol="0" anchor="ctr"/>
+            <a:lstStyle/>
+            <a:p>
+              <a:pPr algn="ctr"/>
+              <a:r>
+                <a:rPr lang="de-DE" dirty="0" smtClean="0">
+                  <a:solidFill>
+                    <a:schemeClr val="bg1"/>
+                  </a:solidFill>
+                </a:rPr>
+                <a:t>Kredite</a:t>
+              </a:r>
+              <a:endParaRPr lang="de-DE" dirty="0" smtClean="0">
+                <a:solidFill>
+                  <a:schemeClr val="bg1"/>
+                </a:solidFill>
+              </a:endParaRPr>
+            </a:p>
+          </p:txBody>
+        </p:sp>
+      </p:grpSp>
+      <p:sp>
+        <p:nvSpPr>
+          <p:cNvPr id="25" name="Rechteck 24"/>
           <p:cNvSpPr/>
           <p:nvPr/>
         </p:nvSpPr>
         <p:spPr>
           <a:xfrm>
-            <a:off x="683568" y="1196752"/>
-            <a:ext cx="6192688" cy="2016224"/>
+            <a:off x="5652120" y="6237312"/>
+            <a:ext cx="2016224" cy="432048"/>
           </a:xfrm>
           <a:prstGeom prst="rect">
             <a:avLst/>
           </a:prstGeom>
           <a:solidFill>
             <a:schemeClr val="accent1">
-              <a:alpha val="70000"/>
+              <a:alpha val="50000"/>
             </a:schemeClr>
           </a:solidFill>
         </p:spPr>
@@ -6213,60 +7246,50 @@
           <a:lstStyle/>
           <a:p>
             <a:pPr algn="ctr"/>
-            <a:endParaRPr lang="de-DE"/>
+            <a:r>
+              <a:rPr lang="de-DE" b="1" dirty="0" smtClean="0">
+                <a:solidFill>
+                  <a:schemeClr val="tx1"/>
+                </a:solidFill>
+              </a:rPr>
+              <a:t>Kunden</a:t>
+            </a:r>
+            <a:endParaRPr lang="de-DE" b="1" dirty="0">
+              <a:solidFill>
+                <a:schemeClr val="tx1"/>
+              </a:solidFill>
+            </a:endParaRPr>
           </a:p>
         </p:txBody>
       </p:sp>
       <p:sp>
         <p:nvSpPr>
-          <p:cNvPr id="2" name="Titel 1"/>
-          <p:cNvSpPr>
-            <a:spLocks noGrp="1"/>
-          </p:cNvSpPr>
-          <p:nvPr>
-            <p:ph type="title"/>
-          </p:nvPr>
-        </p:nvSpPr>
-        <p:spPr/>
-        <p:txBody>
-          <a:bodyPr>
-            <a:normAutofit/>
-          </a:bodyPr>
-          <a:lstStyle/>
-          <a:p>
-            <a:r>
-              <a:rPr lang="de-DE" dirty="0" smtClean="0"/>
-              <a:t>Aufbau</a:t>
-            </a:r>
-            <a:endParaRPr lang="de-DE" dirty="0"/>
-          </a:p>
-        </p:txBody>
-      </p:sp>
-      <p:sp>
-        <p:nvSpPr>
-          <p:cNvPr id="5" name="Rechteck 4"/>
+          <p:cNvPr id="26" name="Rechteck 25"/>
           <p:cNvSpPr/>
           <p:nvPr/>
         </p:nvSpPr>
         <p:spPr>
           <a:xfrm>
-            <a:off x="2915816" y="1340768"/>
-            <a:ext cx="1728192" cy="432048"/>
+            <a:off x="5652120" y="5661248"/>
+            <a:ext cx="2016224" cy="432048"/>
           </a:xfrm>
           <a:prstGeom prst="rect">
             <a:avLst/>
           </a:prstGeom>
+          <a:solidFill>
+            <a:schemeClr val="accent1">
+              <a:alpha val="50000"/>
+            </a:schemeClr>
+          </a:solidFill>
         </p:spPr>
         <p:style>
-          <a:lnRef idx="2">
-            <a:schemeClr val="accent1">
-              <a:shade val="50000"/>
-            </a:schemeClr>
+          <a:lnRef idx="3">
+            <a:schemeClr val="lt1"/>
           </a:lnRef>
           <a:fillRef idx="1">
             <a:schemeClr val="accent1"/>
           </a:fillRef>
-          <a:effectRef idx="0">
+          <a:effectRef idx="1">
             <a:schemeClr val="accent1"/>
           </a:effectRef>
           <a:fontRef idx="minor">
@@ -6279,292 +7302,40 @@
           <a:p>
             <a:pPr algn="ctr"/>
             <a:r>
-              <a:rPr lang="de-DE" dirty="0" smtClean="0"/>
-              <a:t>Management</a:t>
+              <a:rPr lang="de-DE" b="1" dirty="0" smtClean="0">
+                <a:solidFill>
+                  <a:schemeClr val="tx1"/>
+                </a:solidFill>
+              </a:rPr>
+              <a:t>Primärwirtschaft</a:t>
             </a:r>
-            <a:endParaRPr lang="de-DE" dirty="0"/>
-          </a:p>
-        </p:txBody>
-      </p:sp>
-      <p:sp>
-        <p:nvSpPr>
-          <p:cNvPr id="6" name="Rechteck 5"/>
-          <p:cNvSpPr/>
-          <p:nvPr/>
-        </p:nvSpPr>
-        <p:spPr>
-          <a:xfrm>
-            <a:off x="5004048" y="1988840"/>
-            <a:ext cx="1728192" cy="432048"/>
-          </a:xfrm>
-          <a:prstGeom prst="rect">
-            <a:avLst/>
-          </a:prstGeom>
-        </p:spPr>
-        <p:style>
-          <a:lnRef idx="2">
-            <a:schemeClr val="accent1">
-              <a:shade val="50000"/>
-            </a:schemeClr>
-          </a:lnRef>
-          <a:fillRef idx="1">
-            <a:schemeClr val="accent1"/>
-          </a:fillRef>
-          <a:effectRef idx="0">
-            <a:schemeClr val="accent1"/>
-          </a:effectRef>
-          <a:fontRef idx="minor">
-            <a:schemeClr val="lt1"/>
-          </a:fontRef>
-        </p:style>
-        <p:txBody>
-          <a:bodyPr rtlCol="0" anchor="ctr"/>
-          <a:lstStyle/>
-          <a:p>
-            <a:pPr algn="ctr"/>
-            <a:r>
-              <a:rPr lang="de-DE" dirty="0" smtClean="0"/>
-              <a:t>F&amp;E</a:t>
-            </a:r>
-            <a:endParaRPr lang="de-DE" dirty="0"/>
-          </a:p>
-        </p:txBody>
-      </p:sp>
-      <p:sp>
-        <p:nvSpPr>
-          <p:cNvPr id="7" name="Rechteck 6"/>
-          <p:cNvSpPr/>
-          <p:nvPr/>
-        </p:nvSpPr>
-        <p:spPr>
-          <a:xfrm>
-            <a:off x="2915816" y="1988840"/>
-            <a:ext cx="1728192" cy="432048"/>
-          </a:xfrm>
-          <a:prstGeom prst="rect">
-            <a:avLst/>
-          </a:prstGeom>
-        </p:spPr>
-        <p:style>
-          <a:lnRef idx="2">
-            <a:schemeClr val="accent1">
-              <a:shade val="50000"/>
-            </a:schemeClr>
-          </a:lnRef>
-          <a:fillRef idx="1">
-            <a:schemeClr val="accent1"/>
-          </a:fillRef>
-          <a:effectRef idx="0">
-            <a:schemeClr val="accent1"/>
-          </a:effectRef>
-          <a:fontRef idx="minor">
-            <a:schemeClr val="lt1"/>
-          </a:fontRef>
-        </p:style>
-        <p:txBody>
-          <a:bodyPr rtlCol="0" anchor="ctr"/>
-          <a:lstStyle/>
-          <a:p>
-            <a:pPr algn="ctr"/>
-            <a:r>
-              <a:rPr lang="de-DE" dirty="0" smtClean="0"/>
-              <a:t>HR</a:t>
-            </a:r>
-          </a:p>
-        </p:txBody>
-      </p:sp>
-      <p:sp>
-        <p:nvSpPr>
-          <p:cNvPr id="8" name="Rechteck 7"/>
-          <p:cNvSpPr/>
-          <p:nvPr/>
-        </p:nvSpPr>
-        <p:spPr>
-          <a:xfrm>
-            <a:off x="827584" y="2636912"/>
-            <a:ext cx="1728192" cy="432048"/>
-          </a:xfrm>
-          <a:prstGeom prst="rect">
-            <a:avLst/>
-          </a:prstGeom>
-        </p:spPr>
-        <p:style>
-          <a:lnRef idx="2">
-            <a:schemeClr val="accent1">
-              <a:shade val="50000"/>
-            </a:schemeClr>
-          </a:lnRef>
-          <a:fillRef idx="1">
-            <a:schemeClr val="accent1"/>
-          </a:fillRef>
-          <a:effectRef idx="0">
-            <a:schemeClr val="accent1"/>
-          </a:effectRef>
-          <a:fontRef idx="minor">
-            <a:schemeClr val="lt1"/>
-          </a:fontRef>
-        </p:style>
-        <p:txBody>
-          <a:bodyPr rtlCol="0" anchor="ctr"/>
-          <a:lstStyle/>
-          <a:p>
-            <a:pPr algn="ctr"/>
-            <a:r>
-              <a:rPr lang="de-DE" dirty="0" smtClean="0"/>
-              <a:t>Einkauf</a:t>
-            </a:r>
-          </a:p>
-        </p:txBody>
-      </p:sp>
-      <p:sp>
-        <p:nvSpPr>
-          <p:cNvPr id="10" name="Rechteck 9"/>
-          <p:cNvSpPr/>
-          <p:nvPr/>
-        </p:nvSpPr>
-        <p:spPr>
-          <a:xfrm>
-            <a:off x="2915816" y="2636912"/>
-            <a:ext cx="1728192" cy="432048"/>
-          </a:xfrm>
-          <a:prstGeom prst="rect">
-            <a:avLst/>
-          </a:prstGeom>
-        </p:spPr>
-        <p:style>
-          <a:lnRef idx="2">
-            <a:schemeClr val="accent1">
-              <a:shade val="50000"/>
-            </a:schemeClr>
-          </a:lnRef>
-          <a:fillRef idx="1">
-            <a:schemeClr val="accent1"/>
-          </a:fillRef>
-          <a:effectRef idx="0">
-            <a:schemeClr val="accent1"/>
-          </a:effectRef>
-          <a:fontRef idx="minor">
-            <a:schemeClr val="lt1"/>
-          </a:fontRef>
-        </p:style>
-        <p:txBody>
-          <a:bodyPr rtlCol="0" anchor="ctr"/>
-          <a:lstStyle/>
-          <a:p>
-            <a:pPr algn="ctr"/>
-            <a:r>
-              <a:rPr lang="de-DE" dirty="0" smtClean="0"/>
-              <a:t>Produktion</a:t>
-            </a:r>
-          </a:p>
-        </p:txBody>
-      </p:sp>
-      <p:sp>
-        <p:nvSpPr>
-          <p:cNvPr id="11" name="Rechteck 10"/>
-          <p:cNvSpPr/>
-          <p:nvPr/>
-        </p:nvSpPr>
-        <p:spPr>
-          <a:xfrm>
-            <a:off x="5004048" y="2636912"/>
-            <a:ext cx="1728192" cy="432048"/>
-          </a:xfrm>
-          <a:prstGeom prst="rect">
-            <a:avLst/>
-          </a:prstGeom>
-        </p:spPr>
-        <p:style>
-          <a:lnRef idx="2">
-            <a:schemeClr val="accent1">
-              <a:shade val="50000"/>
-            </a:schemeClr>
-          </a:lnRef>
-          <a:fillRef idx="1">
-            <a:schemeClr val="accent1"/>
-          </a:fillRef>
-          <a:effectRef idx="0">
-            <a:schemeClr val="accent1"/>
-          </a:effectRef>
-          <a:fontRef idx="minor">
-            <a:schemeClr val="lt1"/>
-          </a:fontRef>
-        </p:style>
-        <p:txBody>
-          <a:bodyPr rtlCol="0" anchor="ctr"/>
-          <a:lstStyle/>
-          <a:p>
-            <a:pPr algn="ctr"/>
-            <a:r>
-              <a:rPr lang="de-DE" dirty="0" smtClean="0"/>
-              <a:t>Vertrieb</a:t>
-            </a:r>
-          </a:p>
-        </p:txBody>
-      </p:sp>
-      <p:sp>
-        <p:nvSpPr>
-          <p:cNvPr id="12" name="Rechteck 11"/>
-          <p:cNvSpPr/>
-          <p:nvPr/>
-        </p:nvSpPr>
-        <p:spPr>
-          <a:xfrm>
-            <a:off x="827584" y="1988840"/>
-            <a:ext cx="1728192" cy="432048"/>
-          </a:xfrm>
-          <a:prstGeom prst="rect">
-            <a:avLst/>
-          </a:prstGeom>
-        </p:spPr>
-        <p:style>
-          <a:lnRef idx="2">
-            <a:schemeClr val="accent1">
-              <a:shade val="50000"/>
-            </a:schemeClr>
-          </a:lnRef>
-          <a:fillRef idx="1">
-            <a:schemeClr val="accent1"/>
-          </a:fillRef>
-          <a:effectRef idx="0">
-            <a:schemeClr val="accent1"/>
-          </a:effectRef>
-          <a:fontRef idx="minor">
-            <a:schemeClr val="lt1"/>
-          </a:fontRef>
-        </p:style>
-        <p:txBody>
-          <a:bodyPr rtlCol="0" anchor="ctr"/>
-          <a:lstStyle/>
-          <a:p>
-            <a:pPr algn="ctr"/>
-            <a:r>
-              <a:rPr lang="de-DE" dirty="0" smtClean="0"/>
-              <a:t>Finanzen</a:t>
-            </a:r>
+            <a:endParaRPr lang="de-DE" b="1" dirty="0">
+              <a:solidFill>
+                <a:schemeClr val="tx1"/>
+              </a:solidFill>
+            </a:endParaRPr>
           </a:p>
         </p:txBody>
       </p:sp>
       <p:cxnSp>
         <p:nvCxnSpPr>
-          <p:cNvPr id="14" name="Gerade Verbindung mit Pfeil 13"/>
+          <p:cNvPr id="27" name="Gerade Verbindung mit Pfeil 26"/>
           <p:cNvCxnSpPr>
-            <a:stCxn id="8" idx="3"/>
-            <a:endCxn id="10" idx="1"/>
+            <a:stCxn id="26" idx="1"/>
           </p:cNvCxnSpPr>
           <p:nvPr/>
         </p:nvCxnSpPr>
         <p:spPr>
-          <a:xfrm>
-            <a:off x="2555776" y="2852936"/>
-            <a:ext cx="360040" cy="0"/>
+          <a:xfrm flipH="1">
+            <a:off x="3707904" y="5877272"/>
+            <a:ext cx="1944216" cy="0"/>
           </a:xfrm>
           <a:prstGeom prst="straightConnector1">
             <a:avLst/>
           </a:prstGeom>
-          <a:ln w="38100">
+          <a:ln w="76200">
             <a:solidFill>
-              <a:schemeClr val="accent1"/>
+              <a:schemeClr val="tx1"/>
             </a:solidFill>
             <a:headEnd type="none" w="med" len="med"/>
             <a:tailEnd type="triangle" w="med" len="med"/>
@@ -6587,21 +7358,23 @@
       </p:cxnSp>
       <p:cxnSp>
         <p:nvCxnSpPr>
-          <p:cNvPr id="15" name="Gerade Verbindung mit Pfeil 14"/>
-          <p:cNvCxnSpPr/>
+          <p:cNvPr id="28" name="Gerade Verbindung mit Pfeil 27"/>
+          <p:cNvCxnSpPr>
+            <a:endCxn id="25" idx="1"/>
+          </p:cNvCxnSpPr>
           <p:nvPr/>
         </p:nvCxnSpPr>
         <p:spPr>
           <a:xfrm>
-            <a:off x="4644008" y="2852936"/>
-            <a:ext cx="360040" cy="0"/>
+            <a:off x="3707904" y="6453336"/>
+            <a:ext cx="1944216" cy="0"/>
           </a:xfrm>
           <a:prstGeom prst="straightConnector1">
             <a:avLst/>
           </a:prstGeom>
-          <a:ln w="38100">
+          <a:ln w="76200">
             <a:solidFill>
-              <a:schemeClr val="accent1"/>
+              <a:schemeClr val="tx1"/>
             </a:solidFill>
             <a:headEnd type="none" w="med" len="med"/>
             <a:tailEnd type="triangle" w="med" len="med"/>
@@ -6622,16 +7395,613 @@
           </a:fontRef>
         </p:style>
       </p:cxnSp>
+      <p:cxnSp>
+        <p:nvCxnSpPr>
+          <p:cNvPr id="29" name="Gerade Verbindung mit Pfeil 28"/>
+          <p:cNvCxnSpPr/>
+          <p:nvPr/>
+        </p:nvCxnSpPr>
+        <p:spPr>
+          <a:xfrm>
+            <a:off x="2627784" y="3356992"/>
+            <a:ext cx="0" cy="576064"/>
+          </a:xfrm>
+          <a:prstGeom prst="straightConnector1">
+            <a:avLst/>
+          </a:prstGeom>
+          <a:ln w="76200">
+            <a:solidFill>
+              <a:schemeClr val="tx1"/>
+            </a:solidFill>
+            <a:headEnd type="triangle" w="med" len="med"/>
+            <a:tailEnd type="triangle" w="med" len="med"/>
+          </a:ln>
+        </p:spPr>
+        <p:style>
+          <a:lnRef idx="1">
+            <a:schemeClr val="accent1"/>
+          </a:lnRef>
+          <a:fillRef idx="0">
+            <a:schemeClr val="accent1"/>
+          </a:fillRef>
+          <a:effectRef idx="0">
+            <a:schemeClr val="accent1"/>
+          </a:effectRef>
+          <a:fontRef idx="minor">
+            <a:schemeClr val="tx1"/>
+          </a:fontRef>
+        </p:style>
+      </p:cxnSp>
+      <p:cxnSp>
+        <p:nvCxnSpPr>
+          <p:cNvPr id="30" name="Gerade Verbindung mit Pfeil 29"/>
+          <p:cNvCxnSpPr/>
+          <p:nvPr/>
+        </p:nvCxnSpPr>
+        <p:spPr>
+          <a:xfrm>
+            <a:off x="6660232" y="3356992"/>
+            <a:ext cx="0" cy="576064"/>
+          </a:xfrm>
+          <a:prstGeom prst="straightConnector1">
+            <a:avLst/>
+          </a:prstGeom>
+          <a:ln w="76200">
+            <a:solidFill>
+              <a:schemeClr val="tx1"/>
+            </a:solidFill>
+            <a:headEnd type="triangle" w="med" len="med"/>
+            <a:tailEnd type="triangle" w="med" len="med"/>
+          </a:ln>
+        </p:spPr>
+        <p:style>
+          <a:lnRef idx="1">
+            <a:schemeClr val="accent1"/>
+          </a:lnRef>
+          <a:fillRef idx="0">
+            <a:schemeClr val="accent1"/>
+          </a:fillRef>
+          <a:effectRef idx="0">
+            <a:schemeClr val="accent1"/>
+          </a:effectRef>
+          <a:fontRef idx="minor">
+            <a:schemeClr val="tx1"/>
+          </a:fontRef>
+        </p:style>
+      </p:cxnSp>
+      <p:sp>
+        <p:nvSpPr>
+          <p:cNvPr id="31" name="Rechteck 30"/>
+          <p:cNvSpPr/>
+          <p:nvPr/>
+        </p:nvSpPr>
+        <p:spPr>
+          <a:xfrm rot="21258305">
+            <a:off x="641404" y="4121917"/>
+            <a:ext cx="936104" cy="648072"/>
+          </a:xfrm>
+          <a:prstGeom prst="rect">
+            <a:avLst/>
+          </a:prstGeom>
+        </p:spPr>
+        <p:style>
+          <a:lnRef idx="1">
+            <a:schemeClr val="dk1"/>
+          </a:lnRef>
+          <a:fillRef idx="2">
+            <a:schemeClr val="dk1"/>
+          </a:fillRef>
+          <a:effectRef idx="1">
+            <a:schemeClr val="dk1"/>
+          </a:effectRef>
+          <a:fontRef idx="minor">
+            <a:schemeClr val="dk1"/>
+          </a:fontRef>
+        </p:style>
+        <p:txBody>
+          <a:bodyPr rtlCol="0" anchor="ctr"/>
+          <a:lstStyle/>
+          <a:p>
+            <a:pPr algn="ctr"/>
+            <a:r>
+              <a:rPr lang="de-DE" dirty="0" smtClean="0">
+                <a:solidFill>
+                  <a:schemeClr val="bg1"/>
+                </a:solidFill>
+              </a:rPr>
+              <a:t>flexible Preise</a:t>
+            </a:r>
+            <a:endParaRPr lang="de-DE" dirty="0">
+              <a:solidFill>
+                <a:schemeClr val="bg1"/>
+              </a:solidFill>
+            </a:endParaRPr>
+          </a:p>
+        </p:txBody>
+      </p:sp>
     </p:spTree>
     <p:extLst>
       <p:ext uri="{BB962C8B-B14F-4D97-AF65-F5344CB8AC3E}">
-        <p14:creationId xmlns:p14="http://schemas.microsoft.com/office/powerpoint/2010/main" val="84225068"/>
+        <p14:creationId xmlns:p14="http://schemas.microsoft.com/office/powerpoint/2010/main" val="2398624926"/>
       </p:ext>
     </p:extLst>
   </p:cSld>
   <p:clrMapOvr>
     <a:masterClrMapping/>
   </p:clrMapOvr>
+  <p:timing>
+    <p:tnLst>
+      <p:par>
+        <p:cTn id="1" dur="indefinite" restart="never" nodeType="tmRoot">
+          <p:childTnLst>
+            <p:seq concurrent="1" nextAc="seek">
+              <p:cTn id="2" dur="indefinite" nodeType="mainSeq">
+                <p:childTnLst>
+                  <p:par>
+                    <p:cTn id="3" fill="hold">
+                      <p:stCondLst>
+                        <p:cond delay="indefinite"/>
+                      </p:stCondLst>
+                      <p:childTnLst>
+                        <p:par>
+                          <p:cTn id="4" fill="hold">
+                            <p:stCondLst>
+                              <p:cond delay="0"/>
+                            </p:stCondLst>
+                            <p:childTnLst>
+                              <p:par>
+                                <p:cTn id="5" presetID="1" presetClass="entr" presetSubtype="0" fill="hold" grpId="0" nodeType="clickEffect">
+                                  <p:stCondLst>
+                                    <p:cond delay="0"/>
+                                  </p:stCondLst>
+                                  <p:childTnLst>
+                                    <p:set>
+                                      <p:cBhvr>
+                                        <p:cTn id="6" dur="1" fill="hold">
+                                          <p:stCondLst>
+                                            <p:cond delay="0"/>
+                                          </p:stCondLst>
+                                        </p:cTn>
+                                        <p:tgtEl>
+                                          <p:spTgt spid="31"/>
+                                        </p:tgtEl>
+                                        <p:attrNameLst>
+                                          <p:attrName>style.visibility</p:attrName>
+                                        </p:attrNameLst>
+                                      </p:cBhvr>
+                                      <p:to>
+                                        <p:strVal val="visible"/>
+                                      </p:to>
+                                    </p:set>
+                                  </p:childTnLst>
+                                </p:cTn>
+                              </p:par>
+                            </p:childTnLst>
+                          </p:cTn>
+                        </p:par>
+                      </p:childTnLst>
+                    </p:cTn>
+                  </p:par>
+                </p:childTnLst>
+              </p:cTn>
+              <p:prevCondLst>
+                <p:cond evt="onPrev" delay="0">
+                  <p:tgtEl>
+                    <p:sldTgt/>
+                  </p:tgtEl>
+                </p:cond>
+              </p:prevCondLst>
+              <p:nextCondLst>
+                <p:cond evt="onNext" delay="0">
+                  <p:tgtEl>
+                    <p:sldTgt/>
+                  </p:tgtEl>
+                </p:cond>
+              </p:nextCondLst>
+            </p:seq>
+          </p:childTnLst>
+        </p:cTn>
+      </p:par>
+    </p:tnLst>
+    <p:bldLst>
+      <p:bldP spid="31" grpId="0" animBg="1"/>
+    </p:bldLst>
+  </p:timing>
+</p:sld>
+</file>
+
+<file path=ppt/slides/slide4.xml><?xml version="1.0" encoding="utf-8"?>
+<p:sld xmlns:a="http://schemas.openxmlformats.org/drawingml/2006/main" xmlns:r="http://schemas.openxmlformats.org/officeDocument/2006/relationships" xmlns:p="http://schemas.openxmlformats.org/presentationml/2006/main">
+  <p:cSld>
+    <p:spTree>
+      <p:nvGrpSpPr>
+        <p:cNvPr id="1" name=""/>
+        <p:cNvGrpSpPr/>
+        <p:nvPr/>
+      </p:nvGrpSpPr>
+      <p:grpSpPr>
+        <a:xfrm>
+          <a:off x="0" y="0"/>
+          <a:ext cx="0" cy="0"/>
+          <a:chOff x="0" y="0"/>
+          <a:chExt cx="0" cy="0"/>
+        </a:xfrm>
+      </p:grpSpPr>
+      <p:sp>
+        <p:nvSpPr>
+          <p:cNvPr id="3" name="Titel 2"/>
+          <p:cNvSpPr>
+            <a:spLocks noGrp="1"/>
+          </p:cNvSpPr>
+          <p:nvPr>
+            <p:ph type="title"/>
+          </p:nvPr>
+        </p:nvSpPr>
+        <p:spPr/>
+        <p:txBody>
+          <a:bodyPr/>
+          <a:lstStyle/>
+          <a:p>
+            <a:r>
+              <a:rPr lang="de-DE" dirty="0" smtClean="0"/>
+              <a:t>Ideen</a:t>
+            </a:r>
+            <a:endParaRPr lang="de-DE" dirty="0"/>
+          </a:p>
+        </p:txBody>
+      </p:sp>
+      <p:grpSp>
+        <p:nvGrpSpPr>
+          <p:cNvPr id="4" name="Gruppieren 3"/>
+          <p:cNvGrpSpPr/>
+          <p:nvPr/>
+        </p:nvGrpSpPr>
+        <p:grpSpPr>
+          <a:xfrm>
+            <a:off x="467544" y="1484784"/>
+            <a:ext cx="3384376" cy="2920390"/>
+            <a:chOff x="323528" y="980728"/>
+            <a:chExt cx="3384376" cy="2920390"/>
+          </a:xfrm>
+          <a:scene3d>
+            <a:camera prst="perspectiveHeroicExtremeRightFacing">
+              <a:rot lat="398250" lon="20739177" rev="31128"/>
+            </a:camera>
+            <a:lightRig rig="threePt" dir="t"/>
+          </a:scene3d>
+        </p:grpSpPr>
+        <p:pic>
+          <p:nvPicPr>
+            <p:cNvPr id="5" name="Picture 2" descr="http://prototypen.com/blog/cassandra/archive/Wurmloch.jpg"/>
+            <p:cNvPicPr>
+              <a:picLocks noChangeAspect="1" noChangeArrowheads="1"/>
+            </p:cNvPicPr>
+            <p:nvPr/>
+          </p:nvPicPr>
+          <p:blipFill>
+            <a:blip r:embed="rId2">
+              <a:extLst>
+                <a:ext uri="{28A0092B-C50C-407E-A947-70E740481C1C}">
+                  <a14:useLocalDpi xmlns:a14="http://schemas.microsoft.com/office/drawing/2010/main" val="0"/>
+                </a:ext>
+              </a:extLst>
+            </a:blip>
+            <a:srcRect/>
+            <a:stretch>
+              <a:fillRect/>
+            </a:stretch>
+          </p:blipFill>
+          <p:spPr bwMode="auto">
+            <a:xfrm>
+              <a:off x="323528" y="980728"/>
+              <a:ext cx="3360373" cy="2520280"/>
+            </a:xfrm>
+            <a:prstGeom prst="rect">
+              <a:avLst/>
+            </a:prstGeom>
+            <a:ln>
+              <a:noFill/>
+            </a:ln>
+            <a:effectLst>
+              <a:reflection blurRad="12700" stA="30000" endPos="30000" dist="5000" dir="5400000" sy="-100000" algn="bl" rotWithShape="0"/>
+            </a:effectLst>
+            <a:scene3d>
+              <a:camera prst="perspectiveContrastingLeftFacing">
+                <a:rot lat="300000" lon="19800000" rev="0"/>
+              </a:camera>
+              <a:lightRig rig="threePt" dir="t">
+                <a:rot lat="0" lon="0" rev="2700000"/>
+              </a:lightRig>
+            </a:scene3d>
+            <a:sp3d>
+              <a:bevelT w="63500" h="50800"/>
+            </a:sp3d>
+            <a:extLst>
+              <a:ext uri="{909E8E84-426E-40DD-AFC4-6F175D3DCCD1}">
+                <a14:hiddenFill xmlns:a14="http://schemas.microsoft.com/office/drawing/2010/main">
+                  <a:solidFill>
+                    <a:srgbClr val="FFFFFF"/>
+                  </a:solidFill>
+                </a14:hiddenFill>
+              </a:ext>
+            </a:extLst>
+          </p:spPr>
+        </p:pic>
+        <p:sp>
+          <p:nvSpPr>
+            <p:cNvPr id="6" name="Textfeld 5"/>
+            <p:cNvSpPr txBox="1"/>
+            <p:nvPr/>
+          </p:nvSpPr>
+          <p:spPr>
+            <a:xfrm>
+              <a:off x="323528" y="3501008"/>
+              <a:ext cx="3384376" cy="400110"/>
+            </a:xfrm>
+            <a:prstGeom prst="rect">
+              <a:avLst/>
+            </a:prstGeom>
+            <a:noFill/>
+          </p:spPr>
+          <p:txBody>
+            <a:bodyPr wrap="square" rtlCol="0">
+              <a:spAutoFit/>
+            </a:bodyPr>
+            <a:lstStyle/>
+            <a:p>
+              <a:pPr algn="ctr"/>
+              <a:r>
+                <a:rPr lang="de-DE" sz="2000" b="1" dirty="0" smtClean="0">
+                  <a:solidFill>
+                    <a:schemeClr val="bg1"/>
+                  </a:solidFill>
+                </a:rPr>
+                <a:t>Zufallsereignisse</a:t>
+              </a:r>
+              <a:endParaRPr lang="de-DE" sz="2000" b="1" dirty="0">
+                <a:solidFill>
+                  <a:schemeClr val="bg1"/>
+                </a:solidFill>
+              </a:endParaRPr>
+            </a:p>
+          </p:txBody>
+        </p:sp>
+      </p:grpSp>
+      <p:grpSp>
+        <p:nvGrpSpPr>
+          <p:cNvPr id="7" name="Gruppieren 6"/>
+          <p:cNvGrpSpPr/>
+          <p:nvPr/>
+        </p:nvGrpSpPr>
+        <p:grpSpPr>
+          <a:xfrm>
+            <a:off x="4409713" y="2132856"/>
+            <a:ext cx="4734287" cy="2416334"/>
+            <a:chOff x="4409713" y="1556792"/>
+            <a:chExt cx="4734287" cy="2416334"/>
+          </a:xfrm>
+          <a:scene3d>
+            <a:camera prst="isometricOffAxis1Left">
+              <a:rot lat="21349745" lon="19717391" rev="21301779"/>
+            </a:camera>
+            <a:lightRig rig="threePt" dir="t"/>
+          </a:scene3d>
+        </p:grpSpPr>
+        <p:pic>
+          <p:nvPicPr>
+            <p:cNvPr id="8" name="Picture 4" descr="http://images1.wikia.nocookie.net/memoryalpha/en/images/8/89/USS_Enterprise_caught_in_artificial_wormhole.jpg"/>
+            <p:cNvPicPr>
+              <a:picLocks noChangeAspect="1" noChangeArrowheads="1"/>
+            </p:cNvPicPr>
+            <p:nvPr/>
+          </p:nvPicPr>
+          <p:blipFill>
+            <a:blip r:embed="rId3" cstate="print">
+              <a:extLst>
+                <a:ext uri="{28A0092B-C50C-407E-A947-70E740481C1C}">
+                  <a14:useLocalDpi xmlns:a14="http://schemas.microsoft.com/office/drawing/2010/main" val="0"/>
+                </a:ext>
+              </a:extLst>
+            </a:blip>
+            <a:srcRect/>
+            <a:stretch>
+              <a:fillRect/>
+            </a:stretch>
+          </p:blipFill>
+          <p:spPr bwMode="auto">
+            <a:xfrm>
+              <a:off x="4409713" y="1556792"/>
+              <a:ext cx="4734287" cy="2012072"/>
+            </a:xfrm>
+            <a:prstGeom prst="rect">
+              <a:avLst/>
+            </a:prstGeom>
+            <a:ln>
+              <a:noFill/>
+            </a:ln>
+            <a:effectLst>
+              <a:reflection blurRad="12700" stA="30000" endPos="30000" dist="5000" dir="5400000" sy="-100000" algn="bl" rotWithShape="0"/>
+            </a:effectLst>
+            <a:sp3d>
+              <a:bevelT w="63500" h="50800"/>
+            </a:sp3d>
+            <a:extLst>
+              <a:ext uri="{909E8E84-426E-40DD-AFC4-6F175D3DCCD1}">
+                <a14:hiddenFill xmlns:a14="http://schemas.microsoft.com/office/drawing/2010/main">
+                  <a:solidFill>
+                    <a:srgbClr val="FFFFFF"/>
+                  </a:solidFill>
+                </a14:hiddenFill>
+              </a:ext>
+            </a:extLst>
+          </p:spPr>
+        </p:pic>
+        <p:sp>
+          <p:nvSpPr>
+            <p:cNvPr id="9" name="Textfeld 8"/>
+            <p:cNvSpPr txBox="1"/>
+            <p:nvPr/>
+          </p:nvSpPr>
+          <p:spPr>
+            <a:xfrm>
+              <a:off x="4427984" y="3573016"/>
+              <a:ext cx="4716016" cy="400110"/>
+            </a:xfrm>
+            <a:prstGeom prst="rect">
+              <a:avLst/>
+            </a:prstGeom>
+            <a:noFill/>
+          </p:spPr>
+          <p:txBody>
+            <a:bodyPr wrap="square" rtlCol="0">
+              <a:spAutoFit/>
+            </a:bodyPr>
+            <a:lstStyle/>
+            <a:p>
+              <a:pPr algn="ctr"/>
+              <a:r>
+                <a:rPr lang="de-DE" sz="2000" b="1" dirty="0" smtClean="0">
+                  <a:solidFill>
+                    <a:schemeClr val="bg1"/>
+                  </a:solidFill>
+                </a:rPr>
+                <a:t>Forschung &amp; Entwicklung</a:t>
+              </a:r>
+              <a:endParaRPr lang="de-DE" sz="2000" b="1" dirty="0">
+                <a:solidFill>
+                  <a:schemeClr val="bg1"/>
+                </a:solidFill>
+              </a:endParaRPr>
+            </a:p>
+          </p:txBody>
+        </p:sp>
+      </p:grpSp>
+      <p:grpSp>
+        <p:nvGrpSpPr>
+          <p:cNvPr id="10" name="Gruppieren 9"/>
+          <p:cNvGrpSpPr/>
+          <p:nvPr/>
+        </p:nvGrpSpPr>
+        <p:grpSpPr>
+          <a:xfrm>
+            <a:off x="2555776" y="2636912"/>
+            <a:ext cx="3456384" cy="3928502"/>
+            <a:chOff x="2627784" y="2420888"/>
+            <a:chExt cx="3456384" cy="3928502"/>
+          </a:xfrm>
+          <a:scene3d>
+            <a:camera prst="isometricOffAxis1Right">
+              <a:rot lat="1012845" lon="21296507" rev="21599994"/>
+            </a:camera>
+            <a:lightRig rig="threePt" dir="t"/>
+          </a:scene3d>
+        </p:grpSpPr>
+        <p:pic>
+          <p:nvPicPr>
+            <p:cNvPr id="11" name="Picture 6" descr="http://www.zwicker-systems.com/files/robojet.png"/>
+            <p:cNvPicPr>
+              <a:picLocks noChangeAspect="1" noChangeArrowheads="1"/>
+            </p:cNvPicPr>
+            <p:nvPr/>
+          </p:nvPicPr>
+          <p:blipFill>
+            <a:blip r:embed="rId4">
+              <a:extLst>
+                <a:ext uri="{28A0092B-C50C-407E-A947-70E740481C1C}">
+                  <a14:useLocalDpi xmlns:a14="http://schemas.microsoft.com/office/drawing/2010/main" val="0"/>
+                </a:ext>
+              </a:extLst>
+            </a:blip>
+            <a:srcRect/>
+            <a:stretch>
+              <a:fillRect/>
+            </a:stretch>
+          </p:blipFill>
+          <p:spPr bwMode="auto">
+            <a:xfrm>
+              <a:off x="2699792" y="2420888"/>
+              <a:ext cx="3240360" cy="3564397"/>
+            </a:xfrm>
+            <a:prstGeom prst="rect">
+              <a:avLst/>
+            </a:prstGeom>
+            <a:ln>
+              <a:noFill/>
+            </a:ln>
+            <a:effectLst>
+              <a:reflection blurRad="12700" stA="30000" endPos="30000" dist="5000" dir="5400000" sy="-100000" algn="bl" rotWithShape="0"/>
+            </a:effectLst>
+            <a:sp3d>
+              <a:bevelT w="63500" h="50800"/>
+            </a:sp3d>
+            <a:extLst>
+              <a:ext uri="{909E8E84-426E-40DD-AFC4-6F175D3DCCD1}">
+                <a14:hiddenFill xmlns:a14="http://schemas.microsoft.com/office/drawing/2010/main">
+                  <a:solidFill>
+                    <a:srgbClr val="FFFFFF"/>
+                  </a:solidFill>
+                </a14:hiddenFill>
+              </a:ext>
+            </a:extLst>
+          </p:spPr>
+        </p:pic>
+        <p:sp>
+          <p:nvSpPr>
+            <p:cNvPr id="12" name="Textfeld 11"/>
+            <p:cNvSpPr txBox="1"/>
+            <p:nvPr/>
+          </p:nvSpPr>
+          <p:spPr>
+            <a:xfrm>
+              <a:off x="2627784" y="5949280"/>
+              <a:ext cx="3456384" cy="400110"/>
+            </a:xfrm>
+            <a:prstGeom prst="rect">
+              <a:avLst/>
+            </a:prstGeom>
+            <a:noFill/>
+          </p:spPr>
+          <p:txBody>
+            <a:bodyPr wrap="square" lIns="0" rIns="0" rtlCol="0">
+              <a:spAutoFit/>
+            </a:bodyPr>
+            <a:lstStyle/>
+            <a:p>
+              <a:pPr algn="ctr"/>
+              <a:r>
+                <a:rPr lang="de-DE" sz="2000" b="1" dirty="0" smtClean="0">
+                  <a:solidFill>
+                    <a:schemeClr val="bg1"/>
+                  </a:solidFill>
+                </a:rPr>
+                <a:t>Produktionsverbesserungen</a:t>
+              </a:r>
+              <a:endParaRPr lang="de-DE" sz="2000" b="1" dirty="0">
+                <a:solidFill>
+                  <a:schemeClr val="bg1"/>
+                </a:solidFill>
+              </a:endParaRPr>
+            </a:p>
+          </p:txBody>
+        </p:sp>
+      </p:grpSp>
+    </p:spTree>
+    <p:extLst>
+      <p:ext uri="{BB962C8B-B14F-4D97-AF65-F5344CB8AC3E}">
+        <p14:creationId xmlns:p14="http://schemas.microsoft.com/office/powerpoint/2010/main" val="1006750334"/>
+      </p:ext>
+    </p:extLst>
+  </p:cSld>
+  <p:clrMapOvr>
+    <a:masterClrMapping/>
+  </p:clrMapOvr>
+  <p:timing>
+    <p:tnLst>
+      <p:par>
+        <p:cTn id="1" dur="indefinite" restart="never" nodeType="tmRoot"/>
+      </p:par>
+    </p:tnLst>
+  </p:timing>
 </p:sld>
 </file>
 

</xml_diff>

<commit_message>
Finale Aenderung von Fredriks Presentation
</commit_message>
<xml_diff>
--- a/20 Spielwelt/40 Fredrik/Presentation.pptx
+++ b/20 Spielwelt/40 Fredrik/Presentation.pptx
@@ -4,6 +4,9 @@
   <p:sldMasterIdLst>
     <p:sldMasterId id="2147483660" r:id="rId1"/>
   </p:sldMasterIdLst>
+  <p:notesMasterIdLst>
+    <p:notesMasterId r:id="rId6"/>
+  </p:notesMasterIdLst>
   <p:sldIdLst>
     <p:sldId id="263" r:id="rId2"/>
     <p:sldId id="260" r:id="rId3"/>
@@ -3053,6 +3056,545 @@
 </dgm:styleDef>
 </file>
 
+<file path=ppt/notesMasters/notesMaster1.xml><?xml version="1.0" encoding="utf-8"?>
+<p:notesMaster xmlns:a="http://schemas.openxmlformats.org/drawingml/2006/main" xmlns:r="http://schemas.openxmlformats.org/officeDocument/2006/relationships" xmlns:p="http://schemas.openxmlformats.org/presentationml/2006/main">
+  <p:cSld>
+    <p:bg>
+      <p:bgRef idx="1001">
+        <a:schemeClr val="bg1"/>
+      </p:bgRef>
+    </p:bg>
+    <p:spTree>
+      <p:nvGrpSpPr>
+        <p:cNvPr id="1" name=""/>
+        <p:cNvGrpSpPr/>
+        <p:nvPr/>
+      </p:nvGrpSpPr>
+      <p:grpSpPr>
+        <a:xfrm>
+          <a:off x="0" y="0"/>
+          <a:ext cx="0" cy="0"/>
+          <a:chOff x="0" y="0"/>
+          <a:chExt cx="0" cy="0"/>
+        </a:xfrm>
+      </p:grpSpPr>
+      <p:sp>
+        <p:nvSpPr>
+          <p:cNvPr id="2" name="Kopfzeilenplatzhalter 1"/>
+          <p:cNvSpPr>
+            <a:spLocks noGrp="1"/>
+          </p:cNvSpPr>
+          <p:nvPr>
+            <p:ph type="hdr" sz="quarter"/>
+          </p:nvPr>
+        </p:nvSpPr>
+        <p:spPr>
+          <a:xfrm>
+            <a:off x="0" y="0"/>
+            <a:ext cx="2971800" cy="457200"/>
+          </a:xfrm>
+          <a:prstGeom prst="rect">
+            <a:avLst/>
+          </a:prstGeom>
+        </p:spPr>
+        <p:txBody>
+          <a:bodyPr vert="horz" lIns="91440" tIns="45720" rIns="91440" bIns="45720" rtlCol="0"/>
+          <a:lstStyle>
+            <a:lvl1pPr algn="l">
+              <a:defRPr sz="1200"/>
+            </a:lvl1pPr>
+          </a:lstStyle>
+          <a:p>
+            <a:endParaRPr lang="de-DE"/>
+          </a:p>
+        </p:txBody>
+      </p:sp>
+      <p:sp>
+        <p:nvSpPr>
+          <p:cNvPr id="3" name="Datumsplatzhalter 2"/>
+          <p:cNvSpPr>
+            <a:spLocks noGrp="1"/>
+          </p:cNvSpPr>
+          <p:nvPr>
+            <p:ph type="dt" idx="1"/>
+          </p:nvPr>
+        </p:nvSpPr>
+        <p:spPr>
+          <a:xfrm>
+            <a:off x="3884613" y="0"/>
+            <a:ext cx="2971800" cy="457200"/>
+          </a:xfrm>
+          <a:prstGeom prst="rect">
+            <a:avLst/>
+          </a:prstGeom>
+        </p:spPr>
+        <p:txBody>
+          <a:bodyPr vert="horz" lIns="91440" tIns="45720" rIns="91440" bIns="45720" rtlCol="0"/>
+          <a:lstStyle>
+            <a:lvl1pPr algn="r">
+              <a:defRPr sz="1200"/>
+            </a:lvl1pPr>
+          </a:lstStyle>
+          <a:p>
+            <a:fld id="{FBCE6377-EDCF-41D2-9183-EA072EBF0DE8}" type="datetimeFigureOut">
+              <a:rPr lang="de-DE" smtClean="0"/>
+              <a:t>19.09.2011</a:t>
+            </a:fld>
+            <a:endParaRPr lang="de-DE"/>
+          </a:p>
+        </p:txBody>
+      </p:sp>
+      <p:sp>
+        <p:nvSpPr>
+          <p:cNvPr id="4" name="Folienbildplatzhalter 3"/>
+          <p:cNvSpPr>
+            <a:spLocks noGrp="1" noRot="1" noChangeAspect="1"/>
+          </p:cNvSpPr>
+          <p:nvPr>
+            <p:ph type="sldImg" idx="2"/>
+          </p:nvPr>
+        </p:nvSpPr>
+        <p:spPr>
+          <a:xfrm>
+            <a:off x="1143000" y="685800"/>
+            <a:ext cx="4572000" cy="3429000"/>
+          </a:xfrm>
+          <a:prstGeom prst="rect">
+            <a:avLst/>
+          </a:prstGeom>
+          <a:noFill/>
+          <a:ln w="12700">
+            <a:solidFill>
+              <a:prstClr val="black"/>
+            </a:solidFill>
+          </a:ln>
+        </p:spPr>
+        <p:txBody>
+          <a:bodyPr vert="horz" lIns="91440" tIns="45720" rIns="91440" bIns="45720" rtlCol="0" anchor="ctr"/>
+          <a:lstStyle/>
+          <a:p>
+            <a:endParaRPr lang="de-DE"/>
+          </a:p>
+        </p:txBody>
+      </p:sp>
+      <p:sp>
+        <p:nvSpPr>
+          <p:cNvPr id="5" name="Notizenplatzhalter 4"/>
+          <p:cNvSpPr>
+            <a:spLocks noGrp="1"/>
+          </p:cNvSpPr>
+          <p:nvPr>
+            <p:ph type="body" sz="quarter" idx="3"/>
+          </p:nvPr>
+        </p:nvSpPr>
+        <p:spPr>
+          <a:xfrm>
+            <a:off x="685800" y="4343400"/>
+            <a:ext cx="5486400" cy="4114800"/>
+          </a:xfrm>
+          <a:prstGeom prst="rect">
+            <a:avLst/>
+          </a:prstGeom>
+        </p:spPr>
+        <p:txBody>
+          <a:bodyPr vert="horz" lIns="91440" tIns="45720" rIns="91440" bIns="45720" rtlCol="0"/>
+          <a:lstStyle/>
+          <a:p>
+            <a:pPr lvl="0"/>
+            <a:r>
+              <a:rPr lang="de-DE" smtClean="0"/>
+              <a:t>Textmasterformat bearbeiten</a:t>
+            </a:r>
+          </a:p>
+          <a:p>
+            <a:pPr lvl="1"/>
+            <a:r>
+              <a:rPr lang="de-DE" smtClean="0"/>
+              <a:t>Zweite Ebene</a:t>
+            </a:r>
+          </a:p>
+          <a:p>
+            <a:pPr lvl="2"/>
+            <a:r>
+              <a:rPr lang="de-DE" smtClean="0"/>
+              <a:t>Dritte Ebene</a:t>
+            </a:r>
+          </a:p>
+          <a:p>
+            <a:pPr lvl="3"/>
+            <a:r>
+              <a:rPr lang="de-DE" smtClean="0"/>
+              <a:t>Vierte Ebene</a:t>
+            </a:r>
+          </a:p>
+          <a:p>
+            <a:pPr lvl="4"/>
+            <a:r>
+              <a:rPr lang="de-DE" smtClean="0"/>
+              <a:t>Fünfte Ebene</a:t>
+            </a:r>
+            <a:endParaRPr lang="de-DE"/>
+          </a:p>
+        </p:txBody>
+      </p:sp>
+      <p:sp>
+        <p:nvSpPr>
+          <p:cNvPr id="6" name="Fußzeilenplatzhalter 5"/>
+          <p:cNvSpPr>
+            <a:spLocks noGrp="1"/>
+          </p:cNvSpPr>
+          <p:nvPr>
+            <p:ph type="ftr" sz="quarter" idx="4"/>
+          </p:nvPr>
+        </p:nvSpPr>
+        <p:spPr>
+          <a:xfrm>
+            <a:off x="0" y="8685213"/>
+            <a:ext cx="2971800" cy="457200"/>
+          </a:xfrm>
+          <a:prstGeom prst="rect">
+            <a:avLst/>
+          </a:prstGeom>
+        </p:spPr>
+        <p:txBody>
+          <a:bodyPr vert="horz" lIns="91440" tIns="45720" rIns="91440" bIns="45720" rtlCol="0" anchor="b"/>
+          <a:lstStyle>
+            <a:lvl1pPr algn="l">
+              <a:defRPr sz="1200"/>
+            </a:lvl1pPr>
+          </a:lstStyle>
+          <a:p>
+            <a:endParaRPr lang="de-DE"/>
+          </a:p>
+        </p:txBody>
+      </p:sp>
+      <p:sp>
+        <p:nvSpPr>
+          <p:cNvPr id="7" name="Foliennummernplatzhalter 6"/>
+          <p:cNvSpPr>
+            <a:spLocks noGrp="1"/>
+          </p:cNvSpPr>
+          <p:nvPr>
+            <p:ph type="sldNum" sz="quarter" idx="5"/>
+          </p:nvPr>
+        </p:nvSpPr>
+        <p:spPr>
+          <a:xfrm>
+            <a:off x="3884613" y="8685213"/>
+            <a:ext cx="2971800" cy="457200"/>
+          </a:xfrm>
+          <a:prstGeom prst="rect">
+            <a:avLst/>
+          </a:prstGeom>
+        </p:spPr>
+        <p:txBody>
+          <a:bodyPr vert="horz" lIns="91440" tIns="45720" rIns="91440" bIns="45720" rtlCol="0" anchor="b"/>
+          <a:lstStyle>
+            <a:lvl1pPr algn="r">
+              <a:defRPr sz="1200"/>
+            </a:lvl1pPr>
+          </a:lstStyle>
+          <a:p>
+            <a:fld id="{5E8DF329-EDE8-483F-AFC5-DC8B5ADD6B21}" type="slidenum">
+              <a:rPr lang="de-DE" smtClean="0"/>
+              <a:t>‹Nr.›</a:t>
+            </a:fld>
+            <a:endParaRPr lang="de-DE"/>
+          </a:p>
+        </p:txBody>
+      </p:sp>
+    </p:spTree>
+    <p:extLst>
+      <p:ext uri="{BB962C8B-B14F-4D97-AF65-F5344CB8AC3E}">
+        <p14:creationId xmlns:p14="http://schemas.microsoft.com/office/powerpoint/2010/main" val="517354810"/>
+      </p:ext>
+    </p:extLst>
+  </p:cSld>
+  <p:clrMap bg1="lt1" tx1="dk1" bg2="lt2" tx2="dk2" accent1="accent1" accent2="accent2" accent3="accent3" accent4="accent4" accent5="accent5" accent6="accent6" hlink="hlink" folHlink="folHlink"/>
+  <p:notesStyle>
+    <a:lvl1pPr marL="0" algn="l" defTabSz="914400" rtl="0" eaLnBrk="1" latinLnBrk="0" hangingPunct="1">
+      <a:defRPr sz="1200" kern="1200">
+        <a:solidFill>
+          <a:schemeClr val="tx1"/>
+        </a:solidFill>
+        <a:latin typeface="+mn-lt"/>
+        <a:ea typeface="+mn-ea"/>
+        <a:cs typeface="+mn-cs"/>
+      </a:defRPr>
+    </a:lvl1pPr>
+    <a:lvl2pPr marL="457200" algn="l" defTabSz="914400" rtl="0" eaLnBrk="1" latinLnBrk="0" hangingPunct="1">
+      <a:defRPr sz="1200" kern="1200">
+        <a:solidFill>
+          <a:schemeClr val="tx1"/>
+        </a:solidFill>
+        <a:latin typeface="+mn-lt"/>
+        <a:ea typeface="+mn-ea"/>
+        <a:cs typeface="+mn-cs"/>
+      </a:defRPr>
+    </a:lvl2pPr>
+    <a:lvl3pPr marL="914400" algn="l" defTabSz="914400" rtl="0" eaLnBrk="1" latinLnBrk="0" hangingPunct="1">
+      <a:defRPr sz="1200" kern="1200">
+        <a:solidFill>
+          <a:schemeClr val="tx1"/>
+        </a:solidFill>
+        <a:latin typeface="+mn-lt"/>
+        <a:ea typeface="+mn-ea"/>
+        <a:cs typeface="+mn-cs"/>
+      </a:defRPr>
+    </a:lvl3pPr>
+    <a:lvl4pPr marL="1371600" algn="l" defTabSz="914400" rtl="0" eaLnBrk="1" latinLnBrk="0" hangingPunct="1">
+      <a:defRPr sz="1200" kern="1200">
+        <a:solidFill>
+          <a:schemeClr val="tx1"/>
+        </a:solidFill>
+        <a:latin typeface="+mn-lt"/>
+        <a:ea typeface="+mn-ea"/>
+        <a:cs typeface="+mn-cs"/>
+      </a:defRPr>
+    </a:lvl4pPr>
+    <a:lvl5pPr marL="1828800" algn="l" defTabSz="914400" rtl="0" eaLnBrk="1" latinLnBrk="0" hangingPunct="1">
+      <a:defRPr sz="1200" kern="1200">
+        <a:solidFill>
+          <a:schemeClr val="tx1"/>
+        </a:solidFill>
+        <a:latin typeface="+mn-lt"/>
+        <a:ea typeface="+mn-ea"/>
+        <a:cs typeface="+mn-cs"/>
+      </a:defRPr>
+    </a:lvl5pPr>
+    <a:lvl6pPr marL="2286000" algn="l" defTabSz="914400" rtl="0" eaLnBrk="1" latinLnBrk="0" hangingPunct="1">
+      <a:defRPr sz="1200" kern="1200">
+        <a:solidFill>
+          <a:schemeClr val="tx1"/>
+        </a:solidFill>
+        <a:latin typeface="+mn-lt"/>
+        <a:ea typeface="+mn-ea"/>
+        <a:cs typeface="+mn-cs"/>
+      </a:defRPr>
+    </a:lvl6pPr>
+    <a:lvl7pPr marL="2743200" algn="l" defTabSz="914400" rtl="0" eaLnBrk="1" latinLnBrk="0" hangingPunct="1">
+      <a:defRPr sz="1200" kern="1200">
+        <a:solidFill>
+          <a:schemeClr val="tx1"/>
+        </a:solidFill>
+        <a:latin typeface="+mn-lt"/>
+        <a:ea typeface="+mn-ea"/>
+        <a:cs typeface="+mn-cs"/>
+      </a:defRPr>
+    </a:lvl7pPr>
+    <a:lvl8pPr marL="3200400" algn="l" defTabSz="914400" rtl="0" eaLnBrk="1" latinLnBrk="0" hangingPunct="1">
+      <a:defRPr sz="1200" kern="1200">
+        <a:solidFill>
+          <a:schemeClr val="tx1"/>
+        </a:solidFill>
+        <a:latin typeface="+mn-lt"/>
+        <a:ea typeface="+mn-ea"/>
+        <a:cs typeface="+mn-cs"/>
+      </a:defRPr>
+    </a:lvl8pPr>
+    <a:lvl9pPr marL="3657600" algn="l" defTabSz="914400" rtl="0" eaLnBrk="1" latinLnBrk="0" hangingPunct="1">
+      <a:defRPr sz="1200" kern="1200">
+        <a:solidFill>
+          <a:schemeClr val="tx1"/>
+        </a:solidFill>
+        <a:latin typeface="+mn-lt"/>
+        <a:ea typeface="+mn-ea"/>
+        <a:cs typeface="+mn-cs"/>
+      </a:defRPr>
+    </a:lvl9pPr>
+  </p:notesStyle>
+</p:notesMaster>
+</file>
+
+<file path=ppt/notesSlides/notesSlide1.xml><?xml version="1.0" encoding="utf-8"?>
+<p:notes xmlns:a="http://schemas.openxmlformats.org/drawingml/2006/main" xmlns:r="http://schemas.openxmlformats.org/officeDocument/2006/relationships" xmlns:p="http://schemas.openxmlformats.org/presentationml/2006/main">
+  <p:cSld>
+    <p:spTree>
+      <p:nvGrpSpPr>
+        <p:cNvPr id="1" name=""/>
+        <p:cNvGrpSpPr/>
+        <p:nvPr/>
+      </p:nvGrpSpPr>
+      <p:grpSpPr>
+        <a:xfrm>
+          <a:off x="0" y="0"/>
+          <a:ext cx="0" cy="0"/>
+          <a:chOff x="0" y="0"/>
+          <a:chExt cx="0" cy="0"/>
+        </a:xfrm>
+      </p:grpSpPr>
+      <p:sp>
+        <p:nvSpPr>
+          <p:cNvPr id="2" name="Folienbildplatzhalter 1"/>
+          <p:cNvSpPr>
+            <a:spLocks noGrp="1" noRot="1" noChangeAspect="1"/>
+          </p:cNvSpPr>
+          <p:nvPr>
+            <p:ph type="sldImg"/>
+          </p:nvPr>
+        </p:nvSpPr>
+        <p:spPr/>
+      </p:sp>
+      <p:sp>
+        <p:nvSpPr>
+          <p:cNvPr id="3" name="Notizenplatzhalter 2"/>
+          <p:cNvSpPr>
+            <a:spLocks noGrp="1"/>
+          </p:cNvSpPr>
+          <p:nvPr>
+            <p:ph type="body" idx="1"/>
+          </p:nvPr>
+        </p:nvSpPr>
+        <p:spPr/>
+        <p:txBody>
+          <a:bodyPr/>
+          <a:lstStyle/>
+          <a:p>
+            <a:pPr marL="171450" indent="-171450">
+              <a:buFont typeface="Arial" pitchFamily="34" charset="0"/>
+              <a:buChar char="•"/>
+            </a:pPr>
+            <a:r>
+              <a:rPr lang="de-DE" dirty="0" smtClean="0"/>
+              <a:t>Spieler</a:t>
+            </a:r>
+            <a:r>
+              <a:rPr lang="de-DE" baseline="0" dirty="0" smtClean="0"/>
+              <a:t> dürfen Unternehmen frei benennen</a:t>
+            </a:r>
+          </a:p>
+          <a:p>
+            <a:pPr marL="171450" indent="-171450">
+              <a:buFont typeface="Arial" pitchFamily="34" charset="0"/>
+              <a:buChar char="•"/>
+            </a:pPr>
+            <a:r>
+              <a:rPr lang="de-DE" baseline="0" dirty="0" smtClean="0"/>
+              <a:t>Verschiedene Schiffsklassen produzieren</a:t>
+            </a:r>
+          </a:p>
+          <a:p>
+            <a:pPr marL="171450" indent="-171450">
+              <a:buFont typeface="Arial" pitchFamily="34" charset="0"/>
+              <a:buChar char="•"/>
+            </a:pPr>
+            <a:r>
+              <a:rPr lang="de-DE" dirty="0" smtClean="0"/>
+              <a:t>F&amp;E: auch Basisforschung -&gt; günstig, aber kommt allen zu Gute</a:t>
+            </a:r>
+          </a:p>
+          <a:p>
+            <a:pPr marL="171450" indent="-171450">
+              <a:buFont typeface="Arial" pitchFamily="34" charset="0"/>
+              <a:buChar char="•"/>
+            </a:pPr>
+            <a:r>
+              <a:rPr lang="de-DE" dirty="0" smtClean="0"/>
+              <a:t>Lager +</a:t>
+            </a:r>
+            <a:r>
+              <a:rPr lang="de-DE" baseline="0" dirty="0" smtClean="0"/>
+              <a:t> Arbeitsgeräte bauen / erweitern</a:t>
+            </a:r>
+          </a:p>
+          <a:p>
+            <a:pPr marL="171450" indent="-171450">
+              <a:buFont typeface="Arial" pitchFamily="34" charset="0"/>
+              <a:buChar char="•"/>
+            </a:pPr>
+            <a:r>
+              <a:rPr lang="de-DE" baseline="0" dirty="0" smtClean="0"/>
+              <a:t>nicht gleich alles produzierbar -&gt; Produktionsanlagen bauen</a:t>
+            </a:r>
+          </a:p>
+          <a:p>
+            <a:pPr marL="171450" indent="-171450">
+              <a:buFont typeface="Arial" pitchFamily="34" charset="0"/>
+              <a:buChar char="•"/>
+            </a:pPr>
+            <a:r>
+              <a:rPr lang="de-DE" baseline="0" dirty="0" smtClean="0"/>
+              <a:t>Finanzieren!</a:t>
+            </a:r>
+          </a:p>
+          <a:p>
+            <a:pPr marL="171450" indent="-171450">
+              <a:buFont typeface="Arial" pitchFamily="34" charset="0"/>
+              <a:buChar char="•"/>
+            </a:pPr>
+            <a:r>
+              <a:rPr lang="de-DE" baseline="0" dirty="0" smtClean="0"/>
+              <a:t>Evtl. eigener Rohstoffabbau?</a:t>
+            </a:r>
+          </a:p>
+          <a:p>
+            <a:pPr marL="171450" indent="-171450">
+              <a:buFont typeface="Arial" pitchFamily="34" charset="0"/>
+              <a:buChar char="•"/>
+            </a:pPr>
+            <a:r>
+              <a:rPr lang="de-DE" baseline="0" dirty="0" smtClean="0"/>
+              <a:t>Preise für Verkauf festlegen</a:t>
+            </a:r>
+          </a:p>
+          <a:p>
+            <a:pPr marL="171450" indent="-171450">
+              <a:buFont typeface="Arial" pitchFamily="34" charset="0"/>
+              <a:buChar char="•"/>
+            </a:pPr>
+            <a:r>
+              <a:rPr lang="de-DE" baseline="0" dirty="0" smtClean="0"/>
+              <a:t>Verschiedene Rohstoffe in Kombination -&gt; verschiedene Produkte</a:t>
+            </a:r>
+          </a:p>
+          <a:p>
+            <a:pPr marL="171450" indent="-171450">
+              <a:buFont typeface="Arial" pitchFamily="34" charset="0"/>
+              <a:buChar char="•"/>
+            </a:pPr>
+            <a:r>
+              <a:rPr lang="de-DE" baseline="0" dirty="0" smtClean="0"/>
+              <a:t>Laufende Kosten, für Anlagen, insgesamt</a:t>
+            </a:r>
+          </a:p>
+        </p:txBody>
+      </p:sp>
+      <p:sp>
+        <p:nvSpPr>
+          <p:cNvPr id="4" name="Foliennummernplatzhalter 3"/>
+          <p:cNvSpPr>
+            <a:spLocks noGrp="1"/>
+          </p:cNvSpPr>
+          <p:nvPr>
+            <p:ph type="sldNum" sz="quarter" idx="10"/>
+          </p:nvPr>
+        </p:nvSpPr>
+        <p:spPr/>
+        <p:txBody>
+          <a:bodyPr/>
+          <a:lstStyle/>
+          <a:p>
+            <a:fld id="{5E8DF329-EDE8-483F-AFC5-DC8B5ADD6B21}" type="slidenum">
+              <a:rPr lang="de-DE" smtClean="0"/>
+              <a:t>4</a:t>
+            </a:fld>
+            <a:endParaRPr lang="de-DE"/>
+          </a:p>
+        </p:txBody>
+      </p:sp>
+    </p:spTree>
+    <p:extLst>
+      <p:ext uri="{BB962C8B-B14F-4D97-AF65-F5344CB8AC3E}">
+        <p14:creationId xmlns:p14="http://schemas.microsoft.com/office/powerpoint/2010/main" val="1611727613"/>
+      </p:ext>
+    </p:extLst>
+  </p:cSld>
+  <p:clrMapOvr>
+    <a:masterClrMapping/>
+  </p:clrMapOvr>
+</p:notes>
+</file>
+
 <file path=ppt/slideLayouts/slideLayout1.xml><?xml version="1.0" encoding="utf-8"?>
 <p:sldLayout xmlns:a="http://schemas.openxmlformats.org/drawingml/2006/main" xmlns:r="http://schemas.openxmlformats.org/officeDocument/2006/relationships" xmlns:p="http://schemas.openxmlformats.org/presentationml/2006/main" preserve="1" userDrawn="1">
   <p:cSld name="Titelfolie">
@@ -3089,7 +3631,7 @@
             <a:fld id="{7CB97365-EBCA-4027-87D5-99FC1D4DF0BB}" type="datetimeFigureOut">
               <a:rPr lang="en-US" smtClean="0"/>
               <a:pPr eaLnBrk="1" latinLnBrk="0" hangingPunct="1"/>
-              <a:t>9/18/2011</a:t>
+              <a:t>9/19/2011</a:t>
             </a:fld>
             <a:endParaRPr lang="en-US"/>
           </a:p>
@@ -3354,7 +3896,7 @@
             <a:fld id="{7CB97365-EBCA-4027-87D5-99FC1D4DF0BB}" type="datetimeFigureOut">
               <a:rPr lang="en-US" smtClean="0"/>
               <a:pPr eaLnBrk="1" latinLnBrk="0" hangingPunct="1"/>
-              <a:t>9/18/2011</a:t>
+              <a:t>9/19/2011</a:t>
             </a:fld>
             <a:endParaRPr lang="en-US"/>
           </a:p>
@@ -3533,7 +4075,7 @@
             <a:fld id="{7CB97365-EBCA-4027-87D5-99FC1D4DF0BB}" type="datetimeFigureOut">
               <a:rPr lang="en-US" smtClean="0"/>
               <a:pPr eaLnBrk="1" latinLnBrk="0" hangingPunct="1"/>
-              <a:t>9/18/2011</a:t>
+              <a:t>9/19/2011</a:t>
             </a:fld>
             <a:endParaRPr lang="en-US"/>
           </a:p>
@@ -3890,7 +4432,7 @@
             <a:fld id="{7CB97365-EBCA-4027-87D5-99FC1D4DF0BB}" type="datetimeFigureOut">
               <a:rPr lang="en-US" smtClean="0"/>
               <a:pPr eaLnBrk="1" latinLnBrk="0" hangingPunct="1"/>
-              <a:t>9/18/2011</a:t>
+              <a:t>9/19/2011</a:t>
             </a:fld>
             <a:endParaRPr lang="en-US"/>
           </a:p>
@@ -4188,7 +4730,7 @@
             <a:fld id="{7CB97365-EBCA-4027-87D5-99FC1D4DF0BB}" type="datetimeFigureOut">
               <a:rPr lang="en-US" smtClean="0"/>
               <a:pPr eaLnBrk="1" latinLnBrk="0" hangingPunct="1"/>
-              <a:t>9/18/2011</a:t>
+              <a:t>9/19/2011</a:t>
             </a:fld>
             <a:endParaRPr lang="en-US"/>
           </a:p>
@@ -4573,7 +5115,7 @@
             <a:fld id="{7CB97365-EBCA-4027-87D5-99FC1D4DF0BB}" type="datetimeFigureOut">
               <a:rPr lang="en-US" smtClean="0"/>
               <a:pPr eaLnBrk="1" latinLnBrk="0" hangingPunct="1"/>
-              <a:t>9/18/2011</a:t>
+              <a:t>9/19/2011</a:t>
             </a:fld>
             <a:endParaRPr lang="en-US"/>
           </a:p>
@@ -4690,7 +5232,7 @@
             <a:fld id="{7CB97365-EBCA-4027-87D5-99FC1D4DF0BB}" type="datetimeFigureOut">
               <a:rPr lang="en-US" smtClean="0"/>
               <a:pPr eaLnBrk="1" latinLnBrk="0" hangingPunct="1"/>
-              <a:t>9/18/2011</a:t>
+              <a:t>9/19/2011</a:t>
             </a:fld>
             <a:endParaRPr lang="en-US"/>
           </a:p>
@@ -4784,7 +5326,7 @@
             <a:fld id="{7CB97365-EBCA-4027-87D5-99FC1D4DF0BB}" type="datetimeFigureOut">
               <a:rPr lang="en-US" smtClean="0"/>
               <a:pPr eaLnBrk="1" latinLnBrk="0" hangingPunct="1"/>
-              <a:t>9/18/2011</a:t>
+              <a:t>9/19/2011</a:t>
             </a:fld>
             <a:endParaRPr lang="en-US"/>
           </a:p>
@@ -5046,7 +5588,7 @@
             <a:fld id="{7CB97365-EBCA-4027-87D5-99FC1D4DF0BB}" type="datetimeFigureOut">
               <a:rPr lang="en-US" smtClean="0"/>
               <a:pPr eaLnBrk="1" latinLnBrk="0" hangingPunct="1"/>
-              <a:t>9/18/2011</a:t>
+              <a:t>9/19/2011</a:t>
             </a:fld>
             <a:endParaRPr lang="en-US"/>
           </a:p>
@@ -5314,7 +5856,7 @@
             <a:fld id="{7CB97365-EBCA-4027-87D5-99FC1D4DF0BB}" type="datetimeFigureOut">
               <a:rPr lang="en-US" smtClean="0"/>
               <a:pPr eaLnBrk="1" latinLnBrk="0" hangingPunct="1"/>
-              <a:t>9/18/2011</a:t>
+              <a:t>9/19/2011</a:t>
             </a:fld>
             <a:endParaRPr lang="en-US"/>
           </a:p>
@@ -6869,11 +7411,6 @@
                 </a:rPr>
                 <a:t>Rohstoffe</a:t>
               </a:r>
-              <a:endParaRPr lang="de-DE" dirty="0" smtClean="0">
-                <a:solidFill>
-                  <a:schemeClr val="bg1"/>
-                </a:solidFill>
-              </a:endParaRPr>
             </a:p>
           </p:txBody>
         </p:sp>
@@ -6921,11 +7458,6 @@
                 </a:rPr>
                 <a:t>Arbeitsgerät</a:t>
               </a:r>
-              <a:endParaRPr lang="de-DE" dirty="0" smtClean="0">
-                <a:solidFill>
-                  <a:schemeClr val="bg1"/>
-                </a:solidFill>
-              </a:endParaRPr>
             </a:p>
           </p:txBody>
         </p:sp>
@@ -6973,11 +7505,6 @@
                 </a:rPr>
                 <a:t>Raumschiffe</a:t>
               </a:r>
-              <a:endParaRPr lang="de-DE" dirty="0" smtClean="0">
-                <a:solidFill>
-                  <a:schemeClr val="bg1"/>
-                </a:solidFill>
-              </a:endParaRPr>
             </a:p>
           </p:txBody>
         </p:sp>
@@ -7025,11 +7552,6 @@
                 </a:rPr>
                 <a:t>Personal</a:t>
               </a:r>
-              <a:endParaRPr lang="de-DE" dirty="0" smtClean="0">
-                <a:solidFill>
-                  <a:schemeClr val="bg1"/>
-                </a:solidFill>
-              </a:endParaRPr>
             </a:p>
           </p:txBody>
         </p:sp>
@@ -7146,11 +7668,6 @@
                 </a:rPr>
                 <a:t>Einlagen</a:t>
               </a:r>
-              <a:endParaRPr lang="de-DE" dirty="0" smtClean="0">
-                <a:solidFill>
-                  <a:schemeClr val="bg1"/>
-                </a:solidFill>
-              </a:endParaRPr>
             </a:p>
           </p:txBody>
         </p:sp>
@@ -7198,11 +7715,6 @@
                 </a:rPr>
                 <a:t>Kredite</a:t>
               </a:r>
-              <a:endParaRPr lang="de-DE" dirty="0" smtClean="0">
-                <a:solidFill>
-                  <a:schemeClr val="bg1"/>
-                </a:solidFill>
-              </a:endParaRPr>
             </a:p>
           </p:txBody>
         </p:sp>
@@ -7679,7 +8191,7 @@
             <p:nvPr/>
           </p:nvPicPr>
           <p:blipFill>
-            <a:blip r:embed="rId2">
+            <a:blip r:embed="rId3">
               <a:extLst>
                 <a:ext uri="{28A0092B-C50C-407E-A947-70E740481C1C}">
                   <a14:useLocalDpi xmlns:a14="http://schemas.microsoft.com/office/drawing/2010/main" val="0"/>
@@ -7796,7 +8308,7 @@
             <p:nvPr/>
           </p:nvPicPr>
           <p:blipFill>
-            <a:blip r:embed="rId3" cstate="print">
+            <a:blip r:embed="rId4" cstate="print">
               <a:extLst>
                 <a:ext uri="{28A0092B-C50C-407E-A947-70E740481C1C}">
                   <a14:useLocalDpi xmlns:a14="http://schemas.microsoft.com/office/drawing/2010/main" val="0"/>
@@ -7905,7 +8417,7 @@
             <p:nvPr/>
           </p:nvPicPr>
           <p:blipFill>
-            <a:blip r:embed="rId4">
+            <a:blip r:embed="rId5">
               <a:extLst>
                 <a:ext uri="{28A0092B-C50C-407E-A947-70E740481C1C}">
                   <a14:useLocalDpi xmlns:a14="http://schemas.microsoft.com/office/drawing/2010/main" val="0"/>
@@ -8292,4 +8804,289 @@
   <a:objectDefaults/>
   <a:extraClrSchemeLst/>
 </a:theme>
+</file>
+
+<file path=ppt/theme/theme2.xml><?xml version="1.0" encoding="utf-8"?>
+<a:theme xmlns:a="http://schemas.openxmlformats.org/drawingml/2006/main" name="Larissa">
+  <a:themeElements>
+    <a:clrScheme name="Larissa">
+      <a:dk1>
+        <a:sysClr val="windowText" lastClr="000000"/>
+      </a:dk1>
+      <a:lt1>
+        <a:sysClr val="window" lastClr="FFFFFF"/>
+      </a:lt1>
+      <a:dk2>
+        <a:srgbClr val="1F497D"/>
+      </a:dk2>
+      <a:lt2>
+        <a:srgbClr val="EEECE1"/>
+      </a:lt2>
+      <a:accent1>
+        <a:srgbClr val="4F81BD"/>
+      </a:accent1>
+      <a:accent2>
+        <a:srgbClr val="C0504D"/>
+      </a:accent2>
+      <a:accent3>
+        <a:srgbClr val="9BBB59"/>
+      </a:accent3>
+      <a:accent4>
+        <a:srgbClr val="8064A2"/>
+      </a:accent4>
+      <a:accent5>
+        <a:srgbClr val="4BACC6"/>
+      </a:accent5>
+      <a:accent6>
+        <a:srgbClr val="F79646"/>
+      </a:accent6>
+      <a:hlink>
+        <a:srgbClr val="0000FF"/>
+      </a:hlink>
+      <a:folHlink>
+        <a:srgbClr val="800080"/>
+      </a:folHlink>
+    </a:clrScheme>
+    <a:fontScheme name="Larissa">
+      <a:majorFont>
+        <a:latin typeface="Calibri"/>
+        <a:ea typeface=""/>
+        <a:cs typeface=""/>
+        <a:font script="Jpan" typeface="ＭＳ Ｐゴシック"/>
+        <a:font script="Hang" typeface="맑은 고딕"/>
+        <a:font script="Hans" typeface="宋体"/>
+        <a:font script="Hant" typeface="新細明體"/>
+        <a:font script="Arab" typeface="Times New Roman"/>
+        <a:font script="Hebr" typeface="Times New Roman"/>
+        <a:font script="Thai" typeface="Angsana New"/>
+        <a:font script="Ethi" typeface="Nyala"/>
+        <a:font script="Beng" typeface="Vrinda"/>
+        <a:font script="Gujr" typeface="Shruti"/>
+        <a:font script="Khmr" typeface="MoolBoran"/>
+        <a:font script="Knda" typeface="Tunga"/>
+        <a:font script="Guru" typeface="Raavi"/>
+        <a:font script="Cans" typeface="Euphemia"/>
+        <a:font script="Cher" typeface="Plantagenet Cherokee"/>
+        <a:font script="Yiii" typeface="Microsoft Yi Baiti"/>
+        <a:font script="Tibt" typeface="Microsoft Himalaya"/>
+        <a:font script="Thaa" typeface="MV Boli"/>
+        <a:font script="Deva" typeface="Mangal"/>
+        <a:font script="Telu" typeface="Gautami"/>
+        <a:font script="Taml" typeface="Latha"/>
+        <a:font script="Syrc" typeface="Estrangelo Edessa"/>
+        <a:font script="Orya" typeface="Kalinga"/>
+        <a:font script="Mlym" typeface="Kartika"/>
+        <a:font script="Laoo" typeface="DokChampa"/>
+        <a:font script="Sinh" typeface="Iskoola Pota"/>
+        <a:font script="Mong" typeface="Mongolian Baiti"/>
+        <a:font script="Viet" typeface="Times New Roman"/>
+        <a:font script="Uigh" typeface="Microsoft Uighur"/>
+        <a:font script="Geor" typeface="Sylfaen"/>
+      </a:majorFont>
+      <a:minorFont>
+        <a:latin typeface="Calibri"/>
+        <a:ea typeface=""/>
+        <a:cs typeface=""/>
+        <a:font script="Jpan" typeface="ＭＳ Ｐゴシック"/>
+        <a:font script="Hang" typeface="맑은 고딕"/>
+        <a:font script="Hans" typeface="宋体"/>
+        <a:font script="Hant" typeface="新細明體"/>
+        <a:font script="Arab" typeface="Arial"/>
+        <a:font script="Hebr" typeface="Arial"/>
+        <a:font script="Thai" typeface="Cordia New"/>
+        <a:font script="Ethi" typeface="Nyala"/>
+        <a:font script="Beng" typeface="Vrinda"/>
+        <a:font script="Gujr" typeface="Shruti"/>
+        <a:font script="Khmr" typeface="DaunPenh"/>
+        <a:font script="Knda" typeface="Tunga"/>
+        <a:font script="Guru" typeface="Raavi"/>
+        <a:font script="Cans" typeface="Euphemia"/>
+        <a:font script="Cher" typeface="Plantagenet Cherokee"/>
+        <a:font script="Yiii" typeface="Microsoft Yi Baiti"/>
+        <a:font script="Tibt" typeface="Microsoft Himalaya"/>
+        <a:font script="Thaa" typeface="MV Boli"/>
+        <a:font script="Deva" typeface="Mangal"/>
+        <a:font script="Telu" typeface="Gautami"/>
+        <a:font script="Taml" typeface="Latha"/>
+        <a:font script="Syrc" typeface="Estrangelo Edessa"/>
+        <a:font script="Orya" typeface="Kalinga"/>
+        <a:font script="Mlym" typeface="Kartika"/>
+        <a:font script="Laoo" typeface="DokChampa"/>
+        <a:font script="Sinh" typeface="Iskoola Pota"/>
+        <a:font script="Mong" typeface="Mongolian Baiti"/>
+        <a:font script="Viet" typeface="Arial"/>
+        <a:font script="Uigh" typeface="Microsoft Uighur"/>
+        <a:font script="Geor" typeface="Sylfaen"/>
+      </a:minorFont>
+    </a:fontScheme>
+    <a:fmtScheme name="Larissa">
+      <a:fillStyleLst>
+        <a:solidFill>
+          <a:schemeClr val="phClr"/>
+        </a:solidFill>
+        <a:gradFill rotWithShape="1">
+          <a:gsLst>
+            <a:gs pos="0">
+              <a:schemeClr val="phClr">
+                <a:tint val="50000"/>
+                <a:satMod val="300000"/>
+              </a:schemeClr>
+            </a:gs>
+            <a:gs pos="35000">
+              <a:schemeClr val="phClr">
+                <a:tint val="37000"/>
+                <a:satMod val="300000"/>
+              </a:schemeClr>
+            </a:gs>
+            <a:gs pos="100000">
+              <a:schemeClr val="phClr">
+                <a:tint val="15000"/>
+                <a:satMod val="350000"/>
+              </a:schemeClr>
+            </a:gs>
+          </a:gsLst>
+          <a:lin ang="16200000" scaled="1"/>
+        </a:gradFill>
+        <a:gradFill rotWithShape="1">
+          <a:gsLst>
+            <a:gs pos="0">
+              <a:schemeClr val="phClr">
+                <a:shade val="51000"/>
+                <a:satMod val="130000"/>
+              </a:schemeClr>
+            </a:gs>
+            <a:gs pos="80000">
+              <a:schemeClr val="phClr">
+                <a:shade val="93000"/>
+                <a:satMod val="130000"/>
+              </a:schemeClr>
+            </a:gs>
+            <a:gs pos="100000">
+              <a:schemeClr val="phClr">
+                <a:shade val="94000"/>
+                <a:satMod val="135000"/>
+              </a:schemeClr>
+            </a:gs>
+          </a:gsLst>
+          <a:lin ang="16200000" scaled="0"/>
+        </a:gradFill>
+      </a:fillStyleLst>
+      <a:lnStyleLst>
+        <a:ln w="9525" cap="flat" cmpd="sng" algn="ctr">
+          <a:solidFill>
+            <a:schemeClr val="phClr">
+              <a:shade val="95000"/>
+              <a:satMod val="105000"/>
+            </a:schemeClr>
+          </a:solidFill>
+          <a:prstDash val="solid"/>
+        </a:ln>
+        <a:ln w="25400" cap="flat" cmpd="sng" algn="ctr">
+          <a:solidFill>
+            <a:schemeClr val="phClr"/>
+          </a:solidFill>
+          <a:prstDash val="solid"/>
+        </a:ln>
+        <a:ln w="38100" cap="flat" cmpd="sng" algn="ctr">
+          <a:solidFill>
+            <a:schemeClr val="phClr"/>
+          </a:solidFill>
+          <a:prstDash val="solid"/>
+        </a:ln>
+      </a:lnStyleLst>
+      <a:effectStyleLst>
+        <a:effectStyle>
+          <a:effectLst>
+            <a:outerShdw blurRad="40000" dist="20000" dir="5400000" rotWithShape="0">
+              <a:srgbClr val="000000">
+                <a:alpha val="38000"/>
+              </a:srgbClr>
+            </a:outerShdw>
+          </a:effectLst>
+        </a:effectStyle>
+        <a:effectStyle>
+          <a:effectLst>
+            <a:outerShdw blurRad="40000" dist="23000" dir="5400000" rotWithShape="0">
+              <a:srgbClr val="000000">
+                <a:alpha val="35000"/>
+              </a:srgbClr>
+            </a:outerShdw>
+          </a:effectLst>
+        </a:effectStyle>
+        <a:effectStyle>
+          <a:effectLst>
+            <a:outerShdw blurRad="40000" dist="23000" dir="5400000" rotWithShape="0">
+              <a:srgbClr val="000000">
+                <a:alpha val="35000"/>
+              </a:srgbClr>
+            </a:outerShdw>
+          </a:effectLst>
+          <a:scene3d>
+            <a:camera prst="orthographicFront">
+              <a:rot lat="0" lon="0" rev="0"/>
+            </a:camera>
+            <a:lightRig rig="threePt" dir="t">
+              <a:rot lat="0" lon="0" rev="1200000"/>
+            </a:lightRig>
+          </a:scene3d>
+          <a:sp3d>
+            <a:bevelT w="63500" h="25400"/>
+          </a:sp3d>
+        </a:effectStyle>
+      </a:effectStyleLst>
+      <a:bgFillStyleLst>
+        <a:solidFill>
+          <a:schemeClr val="phClr"/>
+        </a:solidFill>
+        <a:gradFill rotWithShape="1">
+          <a:gsLst>
+            <a:gs pos="0">
+              <a:schemeClr val="phClr">
+                <a:tint val="40000"/>
+                <a:satMod val="350000"/>
+              </a:schemeClr>
+            </a:gs>
+            <a:gs pos="40000">
+              <a:schemeClr val="phClr">
+                <a:tint val="45000"/>
+                <a:shade val="99000"/>
+                <a:satMod val="350000"/>
+              </a:schemeClr>
+            </a:gs>
+            <a:gs pos="100000">
+              <a:schemeClr val="phClr">
+                <a:shade val="20000"/>
+                <a:satMod val="255000"/>
+              </a:schemeClr>
+            </a:gs>
+          </a:gsLst>
+          <a:path path="circle">
+            <a:fillToRect l="50000" t="-80000" r="50000" b="180000"/>
+          </a:path>
+        </a:gradFill>
+        <a:gradFill rotWithShape="1">
+          <a:gsLst>
+            <a:gs pos="0">
+              <a:schemeClr val="phClr">
+                <a:tint val="80000"/>
+                <a:satMod val="300000"/>
+              </a:schemeClr>
+            </a:gs>
+            <a:gs pos="100000">
+              <a:schemeClr val="phClr">
+                <a:shade val="30000"/>
+                <a:satMod val="200000"/>
+              </a:schemeClr>
+            </a:gs>
+          </a:gsLst>
+          <a:path path="circle">
+            <a:fillToRect l="50000" t="50000" r="50000" b="50000"/>
+          </a:path>
+        </a:gradFill>
+      </a:bgFillStyleLst>
+    </a:fmtScheme>
+  </a:themeElements>
+  <a:objectDefaults/>
+  <a:extraClrSchemeLst/>
+</a:theme>
 </file>
</xml_diff>